<commit_message>
Modificando agente de configuracion y libreria. Empezando servidor central (recepcion)
</commit_message>
<xml_diff>
--- a/Documentos/er.pptx
+++ b/Documentos/er.pptx
@@ -289,7 +289,7 @@
             <a:fld id="{21B9F558-6522-4C10-99CA-66D81924EF51}" type="datetimeFigureOut">
               <a:rPr lang="es-VE" smtClean="0"/>
               <a:pPr/>
-              <a:t>6/20/13</a:t>
+              <a:t>7/9/13</a:t>
             </a:fld>
             <a:endParaRPr lang="es-VE"/>
           </a:p>
@@ -456,7 +456,7 @@
             <a:fld id="{21B9F558-6522-4C10-99CA-66D81924EF51}" type="datetimeFigureOut">
               <a:rPr lang="es-VE" smtClean="0"/>
               <a:pPr/>
-              <a:t>6/20/13</a:t>
+              <a:t>7/9/13</a:t>
             </a:fld>
             <a:endParaRPr lang="es-VE"/>
           </a:p>
@@ -633,7 +633,7 @@
             <a:fld id="{21B9F558-6522-4C10-99CA-66D81924EF51}" type="datetimeFigureOut">
               <a:rPr lang="es-VE" smtClean="0"/>
               <a:pPr/>
-              <a:t>6/20/13</a:t>
+              <a:t>7/9/13</a:t>
             </a:fld>
             <a:endParaRPr lang="es-VE"/>
           </a:p>
@@ -800,7 +800,7 @@
             <a:fld id="{21B9F558-6522-4C10-99CA-66D81924EF51}" type="datetimeFigureOut">
               <a:rPr lang="es-VE" smtClean="0"/>
               <a:pPr/>
-              <a:t>6/20/13</a:t>
+              <a:t>7/9/13</a:t>
             </a:fld>
             <a:endParaRPr lang="es-VE"/>
           </a:p>
@@ -1043,7 +1043,7 @@
             <a:fld id="{21B9F558-6522-4C10-99CA-66D81924EF51}" type="datetimeFigureOut">
               <a:rPr lang="es-VE" smtClean="0"/>
               <a:pPr/>
-              <a:t>6/20/13</a:t>
+              <a:t>7/9/13</a:t>
             </a:fld>
             <a:endParaRPr lang="es-VE"/>
           </a:p>
@@ -1328,7 +1328,7 @@
             <a:fld id="{21B9F558-6522-4C10-99CA-66D81924EF51}" type="datetimeFigureOut">
               <a:rPr lang="es-VE" smtClean="0"/>
               <a:pPr/>
-              <a:t>6/20/13</a:t>
+              <a:t>7/9/13</a:t>
             </a:fld>
             <a:endParaRPr lang="es-VE"/>
           </a:p>
@@ -1747,7 +1747,7 @@
             <a:fld id="{21B9F558-6522-4C10-99CA-66D81924EF51}" type="datetimeFigureOut">
               <a:rPr lang="es-VE" smtClean="0"/>
               <a:pPr/>
-              <a:t>6/20/13</a:t>
+              <a:t>7/9/13</a:t>
             </a:fld>
             <a:endParaRPr lang="es-VE"/>
           </a:p>
@@ -1862,7 +1862,7 @@
             <a:fld id="{21B9F558-6522-4C10-99CA-66D81924EF51}" type="datetimeFigureOut">
               <a:rPr lang="es-VE" smtClean="0"/>
               <a:pPr/>
-              <a:t>6/20/13</a:t>
+              <a:t>7/9/13</a:t>
             </a:fld>
             <a:endParaRPr lang="es-VE"/>
           </a:p>
@@ -1954,7 +1954,7 @@
             <a:fld id="{21B9F558-6522-4C10-99CA-66D81924EF51}" type="datetimeFigureOut">
               <a:rPr lang="es-VE" smtClean="0"/>
               <a:pPr/>
-              <a:t>6/20/13</a:t>
+              <a:t>7/9/13</a:t>
             </a:fld>
             <a:endParaRPr lang="es-VE"/>
           </a:p>
@@ -2228,7 +2228,7 @@
             <a:fld id="{21B9F558-6522-4C10-99CA-66D81924EF51}" type="datetimeFigureOut">
               <a:rPr lang="es-VE" smtClean="0"/>
               <a:pPr/>
-              <a:t>6/20/13</a:t>
+              <a:t>7/9/13</a:t>
             </a:fld>
             <a:endParaRPr lang="es-VE"/>
           </a:p>
@@ -2478,7 +2478,7 @@
             <a:fld id="{21B9F558-6522-4C10-99CA-66D81924EF51}" type="datetimeFigureOut">
               <a:rPr lang="es-VE" smtClean="0"/>
               <a:pPr/>
-              <a:t>6/20/13</a:t>
+              <a:t>7/9/13</a:t>
             </a:fld>
             <a:endParaRPr lang="es-VE"/>
           </a:p>
@@ -2688,7 +2688,7 @@
             <a:fld id="{21B9F558-6522-4C10-99CA-66D81924EF51}" type="datetimeFigureOut">
               <a:rPr lang="es-VE" smtClean="0"/>
               <a:pPr/>
-              <a:t>6/20/13</a:t>
+              <a:t>7/9/13</a:t>
             </a:fld>
             <a:endParaRPr lang="es-VE"/>
           </a:p>
@@ -5101,6 +5101,29 @@
                 </a:solidFill>
               </a:rPr>
               <a:t>fechaYhoraDeploy</a:t>
+            </a:r>
+            <a:endParaRPr lang="en-US" sz="1000" dirty="0" smtClean="0">
+              <a:solidFill>
+                <a:schemeClr val="tx1"/>
+              </a:solidFill>
+            </a:endParaRPr>
+          </a:p>
+          <a:p>
+            <a:r>
+              <a:rPr lang="en-US" sz="1000" dirty="0" smtClean="0">
+                <a:solidFill>
+                  <a:schemeClr val="tx1"/>
+                </a:solidFill>
+              </a:rPr>
+              <a:t>*</a:t>
+            </a:r>
+            <a:r>
+              <a:rPr lang="en-US" sz="1000" dirty="0" err="1" smtClean="0">
+                <a:solidFill>
+                  <a:schemeClr val="tx1"/>
+                </a:solidFill>
+              </a:rPr>
+              <a:t>idProceso</a:t>
             </a:r>
             <a:endParaRPr lang="en-US" sz="1000" dirty="0" smtClean="0">
               <a:solidFill>

</xml_diff>

<commit_message>
Colocando los archivos del tomo final en .txt. Agregando los scripts de la base de datos (creates, drops e inserts). Falta anexar los inserts. Empezando con el servidor central
</commit_message>
<xml_diff>
--- a/Documentos/er.pptx
+++ b/Documentos/er.pptx
@@ -289,7 +289,7 @@
             <a:fld id="{21B9F558-6522-4C10-99CA-66D81924EF51}" type="datetimeFigureOut">
               <a:rPr lang="es-VE" smtClean="0"/>
               <a:pPr/>
-              <a:t>7/9/13</a:t>
+              <a:t>7/12/13</a:t>
             </a:fld>
             <a:endParaRPr lang="es-VE"/>
           </a:p>
@@ -456,7 +456,7 @@
             <a:fld id="{21B9F558-6522-4C10-99CA-66D81924EF51}" type="datetimeFigureOut">
               <a:rPr lang="es-VE" smtClean="0"/>
               <a:pPr/>
-              <a:t>7/9/13</a:t>
+              <a:t>7/12/13</a:t>
             </a:fld>
             <a:endParaRPr lang="es-VE"/>
           </a:p>
@@ -633,7 +633,7 @@
             <a:fld id="{21B9F558-6522-4C10-99CA-66D81924EF51}" type="datetimeFigureOut">
               <a:rPr lang="es-VE" smtClean="0"/>
               <a:pPr/>
-              <a:t>7/9/13</a:t>
+              <a:t>7/12/13</a:t>
             </a:fld>
             <a:endParaRPr lang="es-VE"/>
           </a:p>
@@ -800,7 +800,7 @@
             <a:fld id="{21B9F558-6522-4C10-99CA-66D81924EF51}" type="datetimeFigureOut">
               <a:rPr lang="es-VE" smtClean="0"/>
               <a:pPr/>
-              <a:t>7/9/13</a:t>
+              <a:t>7/12/13</a:t>
             </a:fld>
             <a:endParaRPr lang="es-VE"/>
           </a:p>
@@ -1043,7 +1043,7 @@
             <a:fld id="{21B9F558-6522-4C10-99CA-66D81924EF51}" type="datetimeFigureOut">
               <a:rPr lang="es-VE" smtClean="0"/>
               <a:pPr/>
-              <a:t>7/9/13</a:t>
+              <a:t>7/12/13</a:t>
             </a:fld>
             <a:endParaRPr lang="es-VE"/>
           </a:p>
@@ -1328,7 +1328,7 @@
             <a:fld id="{21B9F558-6522-4C10-99CA-66D81924EF51}" type="datetimeFigureOut">
               <a:rPr lang="es-VE" smtClean="0"/>
               <a:pPr/>
-              <a:t>7/9/13</a:t>
+              <a:t>7/12/13</a:t>
             </a:fld>
             <a:endParaRPr lang="es-VE"/>
           </a:p>
@@ -1747,7 +1747,7 @@
             <a:fld id="{21B9F558-6522-4C10-99CA-66D81924EF51}" type="datetimeFigureOut">
               <a:rPr lang="es-VE" smtClean="0"/>
               <a:pPr/>
-              <a:t>7/9/13</a:t>
+              <a:t>7/12/13</a:t>
             </a:fld>
             <a:endParaRPr lang="es-VE"/>
           </a:p>
@@ -1862,7 +1862,7 @@
             <a:fld id="{21B9F558-6522-4C10-99CA-66D81924EF51}" type="datetimeFigureOut">
               <a:rPr lang="es-VE" smtClean="0"/>
               <a:pPr/>
-              <a:t>7/9/13</a:t>
+              <a:t>7/12/13</a:t>
             </a:fld>
             <a:endParaRPr lang="es-VE"/>
           </a:p>
@@ -1954,7 +1954,7 @@
             <a:fld id="{21B9F558-6522-4C10-99CA-66D81924EF51}" type="datetimeFigureOut">
               <a:rPr lang="es-VE" smtClean="0"/>
               <a:pPr/>
-              <a:t>7/9/13</a:t>
+              <a:t>7/12/13</a:t>
             </a:fld>
             <a:endParaRPr lang="es-VE"/>
           </a:p>
@@ -2228,7 +2228,7 @@
             <a:fld id="{21B9F558-6522-4C10-99CA-66D81924EF51}" type="datetimeFigureOut">
               <a:rPr lang="es-VE" smtClean="0"/>
               <a:pPr/>
-              <a:t>7/9/13</a:t>
+              <a:t>7/12/13</a:t>
             </a:fld>
             <a:endParaRPr lang="es-VE"/>
           </a:p>
@@ -2478,7 +2478,7 @@
             <a:fld id="{21B9F558-6522-4C10-99CA-66D81924EF51}" type="datetimeFigureOut">
               <a:rPr lang="es-VE" smtClean="0"/>
               <a:pPr/>
-              <a:t>7/9/13</a:t>
+              <a:t>7/12/13</a:t>
             </a:fld>
             <a:endParaRPr lang="es-VE"/>
           </a:p>
@@ -2688,7 +2688,7 @@
             <a:fld id="{21B9F558-6522-4C10-99CA-66D81924EF51}" type="datetimeFigureOut">
               <a:rPr lang="es-VE" smtClean="0"/>
               <a:pPr/>
-              <a:t>7/9/13</a:t>
+              <a:t>7/12/13</a:t>
             </a:fld>
             <a:endParaRPr lang="es-VE"/>
           </a:p>
@@ -3067,7 +3067,7 @@
         </p:nvSpPr>
         <p:spPr>
           <a:xfrm>
-            <a:off x="1403648" y="1052736"/>
+            <a:off x="899592" y="0"/>
             <a:ext cx="936104" cy="864096"/>
           </a:xfrm>
           <a:prstGeom prst="roundRect">
@@ -3180,7 +3180,7 @@
         <p:spPr>
           <a:xfrm>
             <a:off x="2699792" y="2492896"/>
-            <a:ext cx="1512168" cy="1152128"/>
+            <a:ext cx="1512168" cy="864096"/>
           </a:xfrm>
           <a:prstGeom prst="roundRect">
             <a:avLst>
@@ -3274,7 +3274,7 @@
                   <a:schemeClr val="tx1"/>
                 </a:solidFill>
               </a:rPr>
-              <a:t>pathEjecutable</a:t>
+              <a:t>fechaActualización</a:t>
             </a:r>
             <a:endParaRPr lang="en-US" sz="1000" dirty="0" smtClean="0">
               <a:solidFill>
@@ -3282,43 +3282,18 @@
               </a:solidFill>
             </a:endParaRPr>
           </a:p>
-          <a:p>
-            <a:r>
-              <a:rPr lang="en-US" sz="1000" dirty="0" smtClean="0">
-                <a:solidFill>
-                  <a:schemeClr val="tx1"/>
-                </a:solidFill>
-              </a:rPr>
-              <a:t>*</a:t>
-            </a:r>
-            <a:r>
-              <a:rPr lang="en-US" sz="1000" dirty="0" err="1" smtClean="0">
-                <a:solidFill>
-                  <a:schemeClr val="tx1"/>
-                </a:solidFill>
-              </a:rPr>
-              <a:t>fechaActualización</a:t>
-            </a:r>
-            <a:endParaRPr lang="en-US" sz="1000" dirty="0" smtClean="0">
-              <a:solidFill>
-                <a:schemeClr val="tx1"/>
-              </a:solidFill>
-            </a:endParaRPr>
-          </a:p>
         </p:txBody>
       </p:sp>
       <p:cxnSp>
         <p:nvCxnSpPr>
           <p:cNvPr id="10" name="Elbow Connector 307"/>
-          <p:cNvCxnSpPr>
-            <a:endCxn id="8" idx="1"/>
-          </p:cNvCxnSpPr>
+          <p:cNvCxnSpPr/>
           <p:nvPr/>
         </p:nvCxnSpPr>
         <p:spPr>
-          <a:xfrm>
-            <a:off x="1835696" y="3068960"/>
-            <a:ext cx="864096" cy="12700"/>
+          <a:xfrm rot="16200000" flipH="1">
+            <a:off x="2159732" y="1736812"/>
+            <a:ext cx="864096" cy="648072"/>
           </a:xfrm>
           <a:prstGeom prst="bentConnector3">
             <a:avLst>
@@ -3355,8 +3330,8 @@
         </p:nvCxnSpPr>
         <p:spPr>
           <a:xfrm>
-            <a:off x="1835696" y="1916832"/>
-            <a:ext cx="0" cy="1152128"/>
+            <a:off x="1619672" y="1628800"/>
+            <a:ext cx="648072" cy="0"/>
           </a:xfrm>
           <a:prstGeom prst="line">
             <a:avLst/>
@@ -3550,7 +3525,7 @@
                   <a:schemeClr val="tx1"/>
                 </a:solidFill>
               </a:rPr>
-              <a:t>imágen</a:t>
+              <a:t>ruta_imágen</a:t>
             </a:r>
             <a:endParaRPr lang="en-US" sz="1000" dirty="0" smtClean="0">
               <a:solidFill>
@@ -3767,52 +3742,6 @@
                 <a:schemeClr val="tx1"/>
               </a:solidFill>
             </a:endParaRPr>
-          </a:p>
-        </p:txBody>
-      </p:sp>
-      <p:sp>
-        <p:nvSpPr>
-          <p:cNvPr id="26" name="25 Triángulo isósceles"/>
-          <p:cNvSpPr/>
-          <p:nvPr/>
-        </p:nvSpPr>
-        <p:spPr>
-          <a:xfrm rot="10800000">
-            <a:off x="1691680" y="1916832"/>
-            <a:ext cx="288032" cy="144016"/>
-          </a:xfrm>
-          <a:prstGeom prst="triangle">
-            <a:avLst/>
-          </a:prstGeom>
-          <a:noFill/>
-          <a:ln w="9525" cmpd="sng">
-            <a:solidFill>
-              <a:schemeClr val="tx1"/>
-            </a:solidFill>
-          </a:ln>
-        </p:spPr>
-        <p:style>
-          <a:lnRef idx="2">
-            <a:schemeClr val="accent1">
-              <a:shade val="50000"/>
-            </a:schemeClr>
-          </a:lnRef>
-          <a:fillRef idx="1">
-            <a:schemeClr val="accent1"/>
-          </a:fillRef>
-          <a:effectRef idx="0">
-            <a:schemeClr val="accent1"/>
-          </a:effectRef>
-          <a:fontRef idx="minor">
-            <a:schemeClr val="lt1"/>
-          </a:fontRef>
-        </p:style>
-        <p:txBody>
-          <a:bodyPr rtlCol="0" anchor="ctr"/>
-          <a:lstStyle/>
-          <a:p>
-            <a:pPr algn="ctr"/>
-            <a:endParaRPr lang="es-VE"/>
           </a:p>
         </p:txBody>
       </p:sp>
@@ -4333,9 +4262,9 @@
           <p:nvPr/>
         </p:nvCxnSpPr>
         <p:spPr>
-          <a:xfrm rot="16200000" flipH="1">
-            <a:off x="4680012" y="2456892"/>
-            <a:ext cx="504056" cy="432048"/>
+          <a:xfrm>
+            <a:off x="4211960" y="2780928"/>
+            <a:ext cx="936104" cy="156716"/>
           </a:xfrm>
           <a:prstGeom prst="bentConnector3">
             <a:avLst>
@@ -4372,8 +4301,8 @@
         </p:nvCxnSpPr>
         <p:spPr>
           <a:xfrm rot="16200000" flipV="1">
-            <a:off x="4932040" y="3068960"/>
-            <a:ext cx="648072" cy="216024"/>
+            <a:off x="4968044" y="3104964"/>
+            <a:ext cx="576064" cy="216024"/>
           </a:xfrm>
           <a:prstGeom prst="bentConnector3">
             <a:avLst>
@@ -5044,7 +4973,7 @@
         <p:spPr>
           <a:xfrm>
             <a:off x="2771800" y="4221088"/>
-            <a:ext cx="1440160" cy="576064"/>
+            <a:ext cx="1440160" cy="792088"/>
           </a:xfrm>
           <a:prstGeom prst="roundRect">
             <a:avLst>
@@ -5077,13 +5006,18 @@
           <a:p>
             <a:pPr algn="ctr"/>
             <a:r>
-              <a:rPr lang="en-US" sz="1000" b="1" dirty="0" smtClean="0">
-                <a:solidFill>
-                  <a:schemeClr val="tx1"/>
-                </a:solidFill>
-              </a:rPr>
-              <a:t>A_N</a:t>
-            </a:r>
+              <a:rPr lang="en-US" sz="1000" b="1" smtClean="0">
+                <a:solidFill>
+                  <a:schemeClr val="tx1"/>
+                </a:solidFill>
+              </a:rPr>
+              <a:t>E_N</a:t>
+            </a:r>
+            <a:endParaRPr lang="en-US" sz="1000" b="1" dirty="0" smtClean="0">
+              <a:solidFill>
+                <a:schemeClr val="tx1"/>
+              </a:solidFill>
+            </a:endParaRPr>
           </a:p>
           <a:p>
             <a:r>
@@ -5100,7 +5034,30 @@
                   <a:schemeClr val="tx1"/>
                 </a:solidFill>
               </a:rPr>
-              <a:t>fechaYhoraDeploy</a:t>
+              <a:t>fechaDeploy</a:t>
+            </a:r>
+            <a:endParaRPr lang="en-US" sz="1000" dirty="0" smtClean="0">
+              <a:solidFill>
+                <a:schemeClr val="tx1"/>
+              </a:solidFill>
+            </a:endParaRPr>
+          </a:p>
+          <a:p>
+            <a:r>
+              <a:rPr lang="en-US" sz="1000" dirty="0" smtClean="0">
+                <a:solidFill>
+                  <a:schemeClr val="tx1"/>
+                </a:solidFill>
+              </a:rPr>
+              <a:t>#</a:t>
+            </a:r>
+            <a:r>
+              <a:rPr lang="en-US" sz="1000" dirty="0" err="1" smtClean="0">
+                <a:solidFill>
+                  <a:schemeClr val="tx1"/>
+                </a:solidFill>
+              </a:rPr>
+              <a:t>horaDeploy</a:t>
             </a:r>
             <a:endParaRPr lang="en-US" sz="1000" dirty="0" smtClean="0">
               <a:solidFill>
@@ -5200,7 +5157,7 @@
           </a:p>
           <a:p>
             <a:r>
-              <a:rPr lang="en-US" sz="1000" dirty="0" smtClean="0">
+              <a:rPr lang="en-US" sz="1000" dirty="0">
                 <a:solidFill>
                   <a:schemeClr val="tx1"/>
                 </a:solidFill>
@@ -5213,7 +5170,7 @@
                   <a:schemeClr val="tx1"/>
                 </a:solidFill>
               </a:rPr>
-              <a:t>cantidadProcesos</a:t>
+              <a:t>idProceso</a:t>
             </a:r>
             <a:endParaRPr lang="en-US" sz="1000" dirty="0" smtClean="0">
               <a:solidFill>
@@ -5236,7 +5193,7 @@
                   <a:schemeClr val="tx1"/>
                 </a:solidFill>
               </a:rPr>
-              <a:t>memoriaDisponible</a:t>
+              <a:t>cantidadProcesos</a:t>
             </a:r>
             <a:endParaRPr lang="en-US" sz="1000" dirty="0" smtClean="0">
               <a:solidFill>
@@ -5259,7 +5216,7 @@
                   <a:schemeClr val="tx1"/>
                 </a:solidFill>
               </a:rPr>
-              <a:t>nombreAplicaciónActual</a:t>
+              <a:t>memoriaDisponible</a:t>
             </a:r>
             <a:endParaRPr lang="en-US" sz="1000" dirty="0" smtClean="0">
               <a:solidFill>
@@ -5282,7 +5239,7 @@
                   <a:schemeClr val="tx1"/>
                 </a:solidFill>
               </a:rPr>
-              <a:t>estadoAplicación</a:t>
+              <a:t>uso_cpu</a:t>
             </a:r>
             <a:endParaRPr lang="en-US" sz="1000" dirty="0" smtClean="0">
               <a:solidFill>
@@ -5305,7 +5262,7 @@
                   <a:schemeClr val="tx1"/>
                 </a:solidFill>
               </a:rPr>
-              <a:t>informaciónAplicación</a:t>
+              <a:t>puertos_disponibles</a:t>
             </a:r>
             <a:endParaRPr lang="en-US" sz="1000" dirty="0" smtClean="0">
               <a:solidFill>
@@ -5328,7 +5285,7 @@
                   <a:schemeClr val="tx1"/>
                 </a:solidFill>
               </a:rPr>
-              <a:t>idProceso</a:t>
+              <a:t>nombreAplicaciónActual</a:t>
             </a:r>
             <a:endParaRPr lang="en-US" sz="1000" dirty="0" smtClean="0">
               <a:solidFill>
@@ -5337,6 +5294,22 @@
             </a:endParaRPr>
           </a:p>
           <a:p>
+            <a:r>
+              <a:rPr lang="en-US" sz="1000" dirty="0" smtClean="0">
+                <a:solidFill>
+                  <a:schemeClr val="tx1"/>
+                </a:solidFill>
+              </a:rPr>
+              <a:t>*</a:t>
+            </a:r>
+            <a:r>
+              <a:rPr lang="en-US" sz="1000" dirty="0" err="1" smtClean="0">
+                <a:solidFill>
+                  <a:schemeClr val="tx1"/>
+                </a:solidFill>
+              </a:rPr>
+              <a:t>estadoAplicación</a:t>
+            </a:r>
             <a:endParaRPr lang="en-US" sz="1000" dirty="0" smtClean="0">
               <a:solidFill>
                 <a:schemeClr val="tx1"/>
@@ -5369,18 +5342,18 @@
       <p:cxnSp>
         <p:nvCxnSpPr>
           <p:cNvPr id="70" name="190 Conector angular"/>
-          <p:cNvCxnSpPr/>
+          <p:cNvCxnSpPr>
+            <a:stCxn id="71" idx="0"/>
+          </p:cNvCxnSpPr>
           <p:nvPr/>
         </p:nvCxnSpPr>
         <p:spPr>
           <a:xfrm rot="5400000">
-            <a:off x="2879812" y="4833158"/>
-            <a:ext cx="576065" cy="504055"/>
-          </a:xfrm>
-          <a:prstGeom prst="bentConnector3">
-            <a:avLst>
-              <a:gd name="adj1" fmla="val 50000"/>
-            </a:avLst>
+            <a:off x="3099347" y="4980876"/>
+            <a:ext cx="208814" cy="575871"/>
+          </a:xfrm>
+          <a:prstGeom prst="bentConnector2">
+            <a:avLst/>
           </a:prstGeom>
           <a:ln>
             <a:solidFill>
@@ -5411,7 +5384,7 @@
         </p:nvSpPr>
         <p:spPr>
           <a:xfrm rot="10976778">
-            <a:off x="3279366" y="4792203"/>
+            <a:off x="3351374" y="5020483"/>
             <a:ext cx="288032" cy="144016"/>
           </a:xfrm>
           <a:prstGeom prst="triangle">
@@ -5490,19 +5463,17 @@
       <p:cxnSp>
         <p:nvCxnSpPr>
           <p:cNvPr id="74" name="Elbow Connector 307"/>
-          <p:cNvCxnSpPr>
-            <a:endCxn id="76" idx="0"/>
-          </p:cNvCxnSpPr>
+          <p:cNvCxnSpPr/>
           <p:nvPr/>
         </p:nvCxnSpPr>
         <p:spPr>
           <a:xfrm rot="16200000" flipH="1">
-            <a:off x="3239852" y="3825044"/>
-            <a:ext cx="360040" cy="144016"/>
+            <a:off x="1187624" y="2348880"/>
+            <a:ext cx="1728192" cy="864096"/>
           </a:xfrm>
           <a:prstGeom prst="bentConnector3">
             <a:avLst>
-              <a:gd name="adj1" fmla="val 50000"/>
+              <a:gd name="adj1" fmla="val 25506"/>
             </a:avLst>
           </a:prstGeom>
           <a:ln>
@@ -5530,13 +5501,255 @@
       <p:cxnSp>
         <p:nvCxnSpPr>
           <p:cNvPr id="75" name="190 Conector angular"/>
+          <p:cNvCxnSpPr>
+            <a:stCxn id="49" idx="0"/>
+          </p:cNvCxnSpPr>
+          <p:nvPr/>
+        </p:nvCxnSpPr>
+        <p:spPr>
+          <a:xfrm rot="16200000" flipV="1">
+            <a:off x="2699792" y="3429000"/>
+            <a:ext cx="576064" cy="1008112"/>
+          </a:xfrm>
+          <a:prstGeom prst="bentConnector2">
+            <a:avLst/>
+          </a:prstGeom>
+          <a:ln>
+            <a:solidFill>
+              <a:schemeClr val="tx1"/>
+            </a:solidFill>
+          </a:ln>
+        </p:spPr>
+        <p:style>
+          <a:lnRef idx="1">
+            <a:schemeClr val="accent1"/>
+          </a:lnRef>
+          <a:fillRef idx="0">
+            <a:schemeClr val="accent1"/>
+          </a:fillRef>
+          <a:effectRef idx="0">
+            <a:schemeClr val="accent1"/>
+          </a:effectRef>
+          <a:fontRef idx="minor">
+            <a:schemeClr val="tx1"/>
+          </a:fontRef>
+        </p:style>
+      </p:cxnSp>
+      <p:sp>
+        <p:nvSpPr>
+          <p:cNvPr id="76" name="58 Triángulo isósceles"/>
+          <p:cNvSpPr/>
+          <p:nvPr/>
+        </p:nvSpPr>
+        <p:spPr>
+          <a:xfrm>
+            <a:off x="3347864" y="4077072"/>
+            <a:ext cx="288032" cy="144016"/>
+          </a:xfrm>
+          <a:prstGeom prst="triangle">
+            <a:avLst/>
+          </a:prstGeom>
+          <a:noFill/>
+          <a:ln w="9525" cmpd="sng">
+            <a:solidFill>
+              <a:schemeClr val="tx1"/>
+            </a:solidFill>
+          </a:ln>
+        </p:spPr>
+        <p:style>
+          <a:lnRef idx="2">
+            <a:schemeClr val="accent1">
+              <a:shade val="50000"/>
+            </a:schemeClr>
+          </a:lnRef>
+          <a:fillRef idx="1">
+            <a:schemeClr val="accent1"/>
+          </a:fillRef>
+          <a:effectRef idx="0">
+            <a:schemeClr val="accent1"/>
+          </a:effectRef>
+          <a:fontRef idx="minor">
+            <a:schemeClr val="lt1"/>
+          </a:fontRef>
+        </p:style>
+        <p:txBody>
+          <a:bodyPr rtlCol="0" anchor="ctr"/>
+          <a:lstStyle/>
+          <a:p>
+            <a:pPr algn="ctr"/>
+            <a:endParaRPr lang="es-VE"/>
+          </a:p>
+        </p:txBody>
+      </p:sp>
+      <p:sp>
+        <p:nvSpPr>
+          <p:cNvPr id="77" name="59 Rectángulo redondeado"/>
+          <p:cNvSpPr/>
+          <p:nvPr/>
+        </p:nvSpPr>
+        <p:spPr>
+          <a:xfrm>
+            <a:off x="4860032" y="5301208"/>
+            <a:ext cx="1944216" cy="1152128"/>
+          </a:xfrm>
+          <a:prstGeom prst="roundRect">
+            <a:avLst>
+              <a:gd name="adj" fmla="val 22949"/>
+            </a:avLst>
+          </a:prstGeom>
+          <a:solidFill>
+            <a:schemeClr val="bg1"/>
+          </a:solidFill>
+        </p:spPr>
+        <p:style>
+          <a:lnRef idx="2">
+            <a:schemeClr val="accent1">
+              <a:shade val="50000"/>
+            </a:schemeClr>
+          </a:lnRef>
+          <a:fillRef idx="1">
+            <a:schemeClr val="accent1"/>
+          </a:fillRef>
+          <a:effectRef idx="0">
+            <a:schemeClr val="accent1"/>
+          </a:effectRef>
+          <a:fontRef idx="minor">
+            <a:schemeClr val="lt1"/>
+          </a:fontRef>
+        </p:style>
+        <p:txBody>
+          <a:bodyPr rtlCol="0" anchor="t"/>
+          <a:lstStyle/>
+          <a:p>
+            <a:pPr algn="ctr"/>
+            <a:r>
+              <a:rPr lang="en-US" sz="1000" b="1" dirty="0" err="1" smtClean="0">
+                <a:solidFill>
+                  <a:schemeClr val="tx1"/>
+                </a:solidFill>
+              </a:rPr>
+              <a:t>MensajeEntreNodos</a:t>
+            </a:r>
+            <a:endParaRPr lang="en-US" sz="1000" b="1" dirty="0" smtClean="0">
+              <a:solidFill>
+                <a:schemeClr val="tx1"/>
+              </a:solidFill>
+            </a:endParaRPr>
+          </a:p>
+          <a:p>
+            <a:r>
+              <a:rPr lang="en-US" sz="1000" dirty="0" smtClean="0">
+                <a:solidFill>
+                  <a:schemeClr val="tx1"/>
+                </a:solidFill>
+              </a:rPr>
+              <a:t>*#id</a:t>
+            </a:r>
+          </a:p>
+          <a:p>
+            <a:r>
+              <a:rPr lang="en-US" sz="1000" dirty="0" smtClean="0">
+                <a:solidFill>
+                  <a:schemeClr val="tx1"/>
+                </a:solidFill>
+              </a:rPr>
+              <a:t>*</a:t>
+            </a:r>
+            <a:r>
+              <a:rPr lang="en-US" sz="1000" dirty="0" err="1" smtClean="0">
+                <a:solidFill>
+                  <a:schemeClr val="tx1"/>
+                </a:solidFill>
+              </a:rPr>
+              <a:t>fecha</a:t>
+            </a:r>
+            <a:endParaRPr lang="en-US" sz="1000" dirty="0" smtClean="0">
+              <a:solidFill>
+                <a:schemeClr val="tx1"/>
+              </a:solidFill>
+            </a:endParaRPr>
+          </a:p>
+          <a:p>
+            <a:r>
+              <a:rPr lang="en-US" sz="1000" dirty="0">
+                <a:solidFill>
+                  <a:schemeClr val="tx1"/>
+                </a:solidFill>
+              </a:rPr>
+              <a:t>*</a:t>
+            </a:r>
+            <a:r>
+              <a:rPr lang="en-US" sz="1000" dirty="0" err="1" smtClean="0">
+                <a:solidFill>
+                  <a:schemeClr val="tx1"/>
+                </a:solidFill>
+              </a:rPr>
+              <a:t>hora</a:t>
+            </a:r>
+            <a:endParaRPr lang="en-US" sz="1000" dirty="0" smtClean="0">
+              <a:solidFill>
+                <a:schemeClr val="tx1"/>
+              </a:solidFill>
+            </a:endParaRPr>
+          </a:p>
+          <a:p>
+            <a:r>
+              <a:rPr lang="en-US" sz="1000" dirty="0" smtClean="0">
+                <a:solidFill>
+                  <a:schemeClr val="tx1"/>
+                </a:solidFill>
+              </a:rPr>
+              <a:t>*</a:t>
+            </a:r>
+            <a:r>
+              <a:rPr lang="en-US" sz="1000" dirty="0" err="1" smtClean="0">
+                <a:solidFill>
+                  <a:schemeClr val="tx1"/>
+                </a:solidFill>
+              </a:rPr>
+              <a:t>mensaje</a:t>
+            </a:r>
+            <a:endParaRPr lang="en-US" sz="1000" dirty="0" smtClean="0">
+              <a:solidFill>
+                <a:schemeClr val="tx1"/>
+              </a:solidFill>
+            </a:endParaRPr>
+          </a:p>
+          <a:p>
+            <a:r>
+              <a:rPr lang="en-US" sz="1000" dirty="0" smtClean="0">
+                <a:solidFill>
+                  <a:schemeClr val="tx1"/>
+                </a:solidFill>
+              </a:rPr>
+              <a:t>*</a:t>
+            </a:r>
+            <a:r>
+              <a:rPr lang="en-US" sz="1000" dirty="0" err="1" smtClean="0">
+                <a:solidFill>
+                  <a:schemeClr val="tx1"/>
+                </a:solidFill>
+              </a:rPr>
+              <a:t>ipDestino</a:t>
+            </a:r>
+            <a:endParaRPr lang="en-US" sz="1000" dirty="0" smtClean="0">
+              <a:solidFill>
+                <a:schemeClr val="tx1"/>
+              </a:solidFill>
+            </a:endParaRPr>
+          </a:p>
+        </p:txBody>
+      </p:sp>
+      <p:cxnSp>
+        <p:nvCxnSpPr>
+          <p:cNvPr id="79" name="190 Conector angular"/>
           <p:cNvCxnSpPr/>
           <p:nvPr/>
         </p:nvCxnSpPr>
         <p:spPr>
-          <a:xfrm rot="16200000" flipV="1">
-            <a:off x="3365866" y="4059070"/>
-            <a:ext cx="288032" cy="36004"/>
+          <a:xfrm rot="5400000">
+            <a:off x="359532" y="4257092"/>
+            <a:ext cx="792088" cy="288032"/>
           </a:xfrm>
           <a:prstGeom prst="bentConnector3">
             <a:avLst>
@@ -5566,13 +5779,13 @@
       </p:cxnSp>
       <p:sp>
         <p:nvSpPr>
-          <p:cNvPr id="76" name="58 Triángulo isósceles"/>
+          <p:cNvPr id="80" name="64 Triángulo isósceles"/>
           <p:cNvSpPr/>
           <p:nvPr/>
         </p:nvSpPr>
         <p:spPr>
-          <a:xfrm>
-            <a:off x="3347864" y="4077072"/>
+          <a:xfrm rot="10976778">
+            <a:off x="759085" y="4000114"/>
             <a:ext cx="288032" cy="144016"/>
           </a:xfrm>
           <a:prstGeom prst="triangle">
@@ -5610,254 +5823,10 @@
           </a:p>
         </p:txBody>
       </p:sp>
-      <p:sp>
-        <p:nvSpPr>
-          <p:cNvPr id="77" name="59 Rectángulo redondeado"/>
-          <p:cNvSpPr/>
-          <p:nvPr/>
-        </p:nvSpPr>
-        <p:spPr>
-          <a:xfrm>
-            <a:off x="4860032" y="5301208"/>
-            <a:ext cx="1944216" cy="1152128"/>
-          </a:xfrm>
-          <a:prstGeom prst="roundRect">
-            <a:avLst>
-              <a:gd name="adj" fmla="val 22949"/>
-            </a:avLst>
-          </a:prstGeom>
-          <a:solidFill>
-            <a:schemeClr val="bg1"/>
-          </a:solidFill>
-        </p:spPr>
-        <p:style>
-          <a:lnRef idx="2">
-            <a:schemeClr val="accent1">
-              <a:shade val="50000"/>
-            </a:schemeClr>
-          </a:lnRef>
-          <a:fillRef idx="1">
-            <a:schemeClr val="accent1"/>
-          </a:fillRef>
-          <a:effectRef idx="0">
-            <a:schemeClr val="accent1"/>
-          </a:effectRef>
-          <a:fontRef idx="minor">
-            <a:schemeClr val="lt1"/>
-          </a:fontRef>
-        </p:style>
-        <p:txBody>
-          <a:bodyPr rtlCol="0" anchor="t"/>
-          <a:lstStyle/>
-          <a:p>
-            <a:pPr algn="ctr"/>
-            <a:r>
-              <a:rPr lang="en-US" sz="1000" b="1" dirty="0" err="1" smtClean="0">
-                <a:solidFill>
-                  <a:schemeClr val="tx1"/>
-                </a:solidFill>
-              </a:rPr>
-              <a:t>MensajeEntreNodos</a:t>
-            </a:r>
-            <a:endParaRPr lang="en-US" sz="1000" b="1" dirty="0" smtClean="0">
-              <a:solidFill>
-                <a:schemeClr val="tx1"/>
-              </a:solidFill>
-            </a:endParaRPr>
-          </a:p>
-          <a:p>
-            <a:r>
-              <a:rPr lang="en-US" sz="1000" dirty="0" smtClean="0">
-                <a:solidFill>
-                  <a:schemeClr val="tx1"/>
-                </a:solidFill>
-              </a:rPr>
-              <a:t>*#id</a:t>
-            </a:r>
-          </a:p>
-          <a:p>
-            <a:r>
-              <a:rPr lang="en-US" sz="1000" dirty="0" smtClean="0">
-                <a:solidFill>
-                  <a:schemeClr val="tx1"/>
-                </a:solidFill>
-              </a:rPr>
-              <a:t>*</a:t>
-            </a:r>
-            <a:r>
-              <a:rPr lang="en-US" sz="1000" dirty="0" err="1" smtClean="0">
-                <a:solidFill>
-                  <a:schemeClr val="tx1"/>
-                </a:solidFill>
-              </a:rPr>
-              <a:t>fecha</a:t>
-            </a:r>
-            <a:endParaRPr lang="en-US" sz="1000" dirty="0" smtClean="0">
-              <a:solidFill>
-                <a:schemeClr val="tx1"/>
-              </a:solidFill>
-            </a:endParaRPr>
-          </a:p>
-          <a:p>
-            <a:r>
-              <a:rPr lang="en-US" sz="1000" dirty="0">
-                <a:solidFill>
-                  <a:schemeClr val="tx1"/>
-                </a:solidFill>
-              </a:rPr>
-              <a:t>*</a:t>
-            </a:r>
-            <a:r>
-              <a:rPr lang="en-US" sz="1000" dirty="0" err="1" smtClean="0">
-                <a:solidFill>
-                  <a:schemeClr val="tx1"/>
-                </a:solidFill>
-              </a:rPr>
-              <a:t>hora</a:t>
-            </a:r>
-            <a:endParaRPr lang="en-US" sz="1000" dirty="0" smtClean="0">
-              <a:solidFill>
-                <a:schemeClr val="tx1"/>
-              </a:solidFill>
-            </a:endParaRPr>
-          </a:p>
-          <a:p>
-            <a:r>
-              <a:rPr lang="en-US" sz="1000" dirty="0" smtClean="0">
-                <a:solidFill>
-                  <a:schemeClr val="tx1"/>
-                </a:solidFill>
-              </a:rPr>
-              <a:t>*</a:t>
-            </a:r>
-            <a:r>
-              <a:rPr lang="en-US" sz="1000" dirty="0" err="1" smtClean="0">
-                <a:solidFill>
-                  <a:schemeClr val="tx1"/>
-                </a:solidFill>
-              </a:rPr>
-              <a:t>mensaje</a:t>
-            </a:r>
-            <a:endParaRPr lang="en-US" sz="1000" dirty="0" smtClean="0">
-              <a:solidFill>
-                <a:schemeClr val="tx1"/>
-              </a:solidFill>
-            </a:endParaRPr>
-          </a:p>
-          <a:p>
-            <a:r>
-              <a:rPr lang="en-US" sz="1000" dirty="0" smtClean="0">
-                <a:solidFill>
-                  <a:schemeClr val="tx1"/>
-                </a:solidFill>
-              </a:rPr>
-              <a:t>*</a:t>
-            </a:r>
-            <a:r>
-              <a:rPr lang="en-US" sz="1000" dirty="0" err="1" smtClean="0">
-                <a:solidFill>
-                  <a:schemeClr val="tx1"/>
-                </a:solidFill>
-              </a:rPr>
-              <a:t>ipDestino</a:t>
-            </a:r>
-            <a:endParaRPr lang="en-US" sz="1000" dirty="0" smtClean="0">
-              <a:solidFill>
-                <a:schemeClr val="tx1"/>
-              </a:solidFill>
-            </a:endParaRPr>
-          </a:p>
-        </p:txBody>
-      </p:sp>
-      <p:cxnSp>
-        <p:nvCxnSpPr>
-          <p:cNvPr id="79" name="190 Conector angular"/>
-          <p:cNvCxnSpPr/>
-          <p:nvPr/>
-        </p:nvCxnSpPr>
-        <p:spPr>
-          <a:xfrm rot="5400000">
-            <a:off x="359532" y="4257092"/>
-            <a:ext cx="792088" cy="288032"/>
-          </a:xfrm>
-          <a:prstGeom prst="bentConnector3">
-            <a:avLst>
-              <a:gd name="adj1" fmla="val 50000"/>
-            </a:avLst>
-          </a:prstGeom>
-          <a:ln>
-            <a:solidFill>
-              <a:schemeClr val="tx1"/>
-            </a:solidFill>
-          </a:ln>
-        </p:spPr>
-        <p:style>
-          <a:lnRef idx="1">
-            <a:schemeClr val="accent1"/>
-          </a:lnRef>
-          <a:fillRef idx="0">
-            <a:schemeClr val="accent1"/>
-          </a:fillRef>
-          <a:effectRef idx="0">
-            <a:schemeClr val="accent1"/>
-          </a:effectRef>
-          <a:fontRef idx="minor">
-            <a:schemeClr val="tx1"/>
-          </a:fontRef>
-        </p:style>
-      </p:cxnSp>
-      <p:sp>
-        <p:nvSpPr>
-          <p:cNvPr id="80" name="64 Triángulo isósceles"/>
-          <p:cNvSpPr/>
-          <p:nvPr/>
-        </p:nvSpPr>
-        <p:spPr>
-          <a:xfrm rot="10976778">
-            <a:off x="759085" y="4000114"/>
-            <a:ext cx="288032" cy="144016"/>
-          </a:xfrm>
-          <a:prstGeom prst="triangle">
-            <a:avLst/>
-          </a:prstGeom>
-          <a:noFill/>
-          <a:ln w="9525" cmpd="sng">
-            <a:solidFill>
-              <a:schemeClr val="tx1"/>
-            </a:solidFill>
-          </a:ln>
-        </p:spPr>
-        <p:style>
-          <a:lnRef idx="2">
-            <a:schemeClr val="accent1">
-              <a:shade val="50000"/>
-            </a:schemeClr>
-          </a:lnRef>
-          <a:fillRef idx="1">
-            <a:schemeClr val="accent1"/>
-          </a:fillRef>
-          <a:effectRef idx="0">
-            <a:schemeClr val="accent1"/>
-          </a:effectRef>
-          <a:fontRef idx="minor">
-            <a:schemeClr val="lt1"/>
-          </a:fontRef>
-        </p:style>
-        <p:txBody>
-          <a:bodyPr rtlCol="0" anchor="ctr"/>
-          <a:lstStyle/>
-          <a:p>
-            <a:pPr algn="ctr"/>
-            <a:endParaRPr lang="es-VE"/>
-          </a:p>
-        </p:txBody>
-      </p:sp>
       <p:cxnSp>
         <p:nvCxnSpPr>
           <p:cNvPr id="81" name="Elbow Connector 307"/>
-          <p:cNvCxnSpPr>
-            <a:endCxn id="57" idx="1"/>
-          </p:cNvCxnSpPr>
+          <p:cNvCxnSpPr/>
           <p:nvPr/>
         </p:nvCxnSpPr>
         <p:spPr>
@@ -5899,9 +5868,9 @@
           <p:nvPr/>
         </p:nvCxnSpPr>
         <p:spPr>
-          <a:xfrm rot="16200000" flipH="1">
-            <a:off x="3887924" y="4833156"/>
-            <a:ext cx="504056" cy="432048"/>
+          <a:xfrm>
+            <a:off x="3851920" y="5013176"/>
+            <a:ext cx="504056" cy="288032"/>
           </a:xfrm>
           <a:prstGeom prst="bentConnector3">
             <a:avLst>
@@ -5938,8 +5907,8 @@
         </p:nvCxnSpPr>
         <p:spPr>
           <a:xfrm rot="16200000" flipV="1">
-            <a:off x="4175956" y="5409220"/>
-            <a:ext cx="576064" cy="216024"/>
+            <a:off x="4211960" y="5445224"/>
+            <a:ext cx="504056" cy="216024"/>
           </a:xfrm>
           <a:prstGeom prst="bentConnector3">
             <a:avLst>
@@ -6033,6 +6002,335 @@
             <a:solidFill>
               <a:schemeClr val="tx1"/>
             </a:solidFill>
+          </a:ln>
+        </p:spPr>
+        <p:style>
+          <a:lnRef idx="1">
+            <a:schemeClr val="accent1"/>
+          </a:lnRef>
+          <a:fillRef idx="0">
+            <a:schemeClr val="accent1"/>
+          </a:fillRef>
+          <a:effectRef idx="0">
+            <a:schemeClr val="accent1"/>
+          </a:effectRef>
+          <a:fontRef idx="minor">
+            <a:schemeClr val="tx1"/>
+          </a:fontRef>
+        </p:style>
+      </p:cxnSp>
+      <p:sp>
+        <p:nvSpPr>
+          <p:cNvPr id="46" name="59 Rectángulo redondeado"/>
+          <p:cNvSpPr/>
+          <p:nvPr/>
+        </p:nvSpPr>
+        <p:spPr>
+          <a:xfrm>
+            <a:off x="24949" y="1124744"/>
+            <a:ext cx="1619672" cy="1008112"/>
+          </a:xfrm>
+          <a:prstGeom prst="roundRect">
+            <a:avLst>
+              <a:gd name="adj" fmla="val 22949"/>
+            </a:avLst>
+          </a:prstGeom>
+          <a:solidFill>
+            <a:schemeClr val="bg1"/>
+          </a:solidFill>
+        </p:spPr>
+        <p:style>
+          <a:lnRef idx="2">
+            <a:schemeClr val="accent1">
+              <a:shade val="50000"/>
+            </a:schemeClr>
+          </a:lnRef>
+          <a:fillRef idx="1">
+            <a:schemeClr val="accent1"/>
+          </a:fillRef>
+          <a:effectRef idx="0">
+            <a:schemeClr val="accent1"/>
+          </a:effectRef>
+          <a:fontRef idx="minor">
+            <a:schemeClr val="lt1"/>
+          </a:fontRef>
+        </p:style>
+        <p:txBody>
+          <a:bodyPr rtlCol="0" anchor="t"/>
+          <a:lstStyle/>
+          <a:p>
+            <a:pPr algn="ctr"/>
+            <a:r>
+              <a:rPr lang="en-US" sz="1000" b="1" dirty="0" err="1" smtClean="0">
+                <a:solidFill>
+                  <a:schemeClr val="tx1"/>
+                </a:solidFill>
+              </a:rPr>
+              <a:t>Ejecutable</a:t>
+            </a:r>
+            <a:endParaRPr lang="en-US" sz="1000" b="1" dirty="0" smtClean="0">
+              <a:solidFill>
+                <a:schemeClr val="tx1"/>
+              </a:solidFill>
+            </a:endParaRPr>
+          </a:p>
+          <a:p>
+            <a:r>
+              <a:rPr lang="en-US" sz="1000" dirty="0" smtClean="0">
+                <a:solidFill>
+                  <a:schemeClr val="tx1"/>
+                </a:solidFill>
+              </a:rPr>
+              <a:t>*#id</a:t>
+            </a:r>
+          </a:p>
+          <a:p>
+            <a:r>
+              <a:rPr lang="en-US" sz="1000" dirty="0" smtClean="0">
+                <a:solidFill>
+                  <a:schemeClr val="tx1"/>
+                </a:solidFill>
+              </a:rPr>
+              <a:t>*</a:t>
+            </a:r>
+            <a:r>
+              <a:rPr lang="en-US" sz="1000" dirty="0" err="1" smtClean="0">
+                <a:solidFill>
+                  <a:schemeClr val="tx1"/>
+                </a:solidFill>
+              </a:rPr>
+              <a:t>nombre</a:t>
+            </a:r>
+            <a:endParaRPr lang="en-US" sz="1000" dirty="0" smtClean="0">
+              <a:solidFill>
+                <a:schemeClr val="tx1"/>
+              </a:solidFill>
+            </a:endParaRPr>
+          </a:p>
+          <a:p>
+            <a:r>
+              <a:rPr lang="en-US" sz="1000" dirty="0" smtClean="0">
+                <a:solidFill>
+                  <a:schemeClr val="tx1"/>
+                </a:solidFill>
+              </a:rPr>
+              <a:t>*</a:t>
+            </a:r>
+            <a:r>
+              <a:rPr lang="en-US" sz="1000" dirty="0" err="1" smtClean="0">
+                <a:solidFill>
+                  <a:schemeClr val="tx1"/>
+                </a:solidFill>
+              </a:rPr>
+              <a:t>tipo</a:t>
+            </a:r>
+            <a:r>
+              <a:rPr lang="en-US" sz="1000" dirty="0" smtClean="0">
+                <a:solidFill>
+                  <a:schemeClr val="tx1"/>
+                </a:solidFill>
+              </a:rPr>
+              <a:t> (</a:t>
+            </a:r>
+            <a:r>
+              <a:rPr lang="en-US" sz="1000" dirty="0" err="1" smtClean="0">
+                <a:solidFill>
+                  <a:schemeClr val="tx1"/>
+                </a:solidFill>
+              </a:rPr>
+              <a:t>cliente</a:t>
+            </a:r>
+            <a:r>
+              <a:rPr lang="en-US" sz="1000" dirty="0" smtClean="0">
+                <a:solidFill>
+                  <a:schemeClr val="tx1"/>
+                </a:solidFill>
+              </a:rPr>
+              <a:t> / </a:t>
+            </a:r>
+            <a:r>
+              <a:rPr lang="en-US" sz="1000" dirty="0" err="1" smtClean="0">
+                <a:solidFill>
+                  <a:schemeClr val="tx1"/>
+                </a:solidFill>
+              </a:rPr>
+              <a:t>servidor</a:t>
+            </a:r>
+            <a:r>
+              <a:rPr lang="en-US" sz="1000" dirty="0" smtClean="0">
+                <a:solidFill>
+                  <a:schemeClr val="tx1"/>
+                </a:solidFill>
+              </a:rPr>
+              <a:t>)</a:t>
+            </a:r>
+          </a:p>
+          <a:p>
+            <a:r>
+              <a:rPr lang="en-US" sz="1000" dirty="0" smtClean="0">
+                <a:solidFill>
+                  <a:schemeClr val="tx1"/>
+                </a:solidFill>
+              </a:rPr>
+              <a:t>*path</a:t>
+            </a:r>
+          </a:p>
+        </p:txBody>
+      </p:sp>
+      <p:sp>
+        <p:nvSpPr>
+          <p:cNvPr id="51" name="35 Triángulo isósceles"/>
+          <p:cNvSpPr/>
+          <p:nvPr/>
+        </p:nvSpPr>
+        <p:spPr>
+          <a:xfrm rot="5400000">
+            <a:off x="1511660" y="1520788"/>
+            <a:ext cx="360039" cy="144016"/>
+          </a:xfrm>
+          <a:prstGeom prst="triangle">
+            <a:avLst>
+              <a:gd name="adj" fmla="val 57586"/>
+            </a:avLst>
+          </a:prstGeom>
+          <a:noFill/>
+          <a:ln w="9525" cmpd="sng">
+            <a:solidFill>
+              <a:schemeClr val="tx1"/>
+            </a:solidFill>
+          </a:ln>
+        </p:spPr>
+        <p:style>
+          <a:lnRef idx="2">
+            <a:schemeClr val="accent1">
+              <a:shade val="50000"/>
+            </a:schemeClr>
+          </a:lnRef>
+          <a:fillRef idx="1">
+            <a:schemeClr val="accent1"/>
+          </a:fillRef>
+          <a:effectRef idx="0">
+            <a:schemeClr val="accent1"/>
+          </a:effectRef>
+          <a:fontRef idx="minor">
+            <a:schemeClr val="lt1"/>
+          </a:fontRef>
+        </p:style>
+        <p:txBody>
+          <a:bodyPr rtlCol="0" anchor="ctr"/>
+          <a:lstStyle/>
+          <a:p>
+            <a:pPr algn="ctr"/>
+            <a:endParaRPr lang="es-VE"/>
+          </a:p>
+        </p:txBody>
+      </p:sp>
+      <p:cxnSp>
+        <p:nvCxnSpPr>
+          <p:cNvPr id="62" name="190 Conector angular"/>
+          <p:cNvCxnSpPr>
+            <a:stCxn id="4" idx="1"/>
+          </p:cNvCxnSpPr>
+          <p:nvPr/>
+        </p:nvCxnSpPr>
+        <p:spPr>
+          <a:xfrm rot="10800000" flipV="1">
+            <a:off x="539552" y="432048"/>
+            <a:ext cx="360040" cy="404664"/>
+          </a:xfrm>
+          <a:prstGeom prst="bentConnector2">
+            <a:avLst/>
+          </a:prstGeom>
+          <a:ln>
+            <a:solidFill>
+              <a:schemeClr val="tx1"/>
+            </a:solidFill>
+          </a:ln>
+        </p:spPr>
+        <p:style>
+          <a:lnRef idx="1">
+            <a:schemeClr val="accent1"/>
+          </a:lnRef>
+          <a:fillRef idx="0">
+            <a:schemeClr val="accent1"/>
+          </a:fillRef>
+          <a:effectRef idx="0">
+            <a:schemeClr val="accent1"/>
+          </a:effectRef>
+          <a:fontRef idx="minor">
+            <a:schemeClr val="tx1"/>
+          </a:fontRef>
+        </p:style>
+      </p:cxnSp>
+      <p:sp>
+        <p:nvSpPr>
+          <p:cNvPr id="63" name="64 Triángulo isósceles"/>
+          <p:cNvSpPr/>
+          <p:nvPr/>
+        </p:nvSpPr>
+        <p:spPr>
+          <a:xfrm rot="16027436">
+            <a:off x="674800" y="345582"/>
+            <a:ext cx="305221" cy="128519"/>
+          </a:xfrm>
+          <a:prstGeom prst="triangle">
+            <a:avLst/>
+          </a:prstGeom>
+          <a:noFill/>
+          <a:ln w="9525" cmpd="sng">
+            <a:solidFill>
+              <a:schemeClr val="tx1"/>
+            </a:solidFill>
+          </a:ln>
+        </p:spPr>
+        <p:style>
+          <a:lnRef idx="2">
+            <a:schemeClr val="accent1">
+              <a:shade val="50000"/>
+            </a:schemeClr>
+          </a:lnRef>
+          <a:fillRef idx="1">
+            <a:schemeClr val="accent1"/>
+          </a:fillRef>
+          <a:effectRef idx="0">
+            <a:schemeClr val="accent1"/>
+          </a:effectRef>
+          <a:fontRef idx="minor">
+            <a:schemeClr val="lt1"/>
+          </a:fontRef>
+        </p:style>
+        <p:txBody>
+          <a:bodyPr rtlCol="0" anchor="ctr"/>
+          <a:lstStyle/>
+          <a:p>
+            <a:pPr algn="ctr"/>
+            <a:endParaRPr lang="es-VE"/>
+          </a:p>
+        </p:txBody>
+      </p:sp>
+      <p:cxnSp>
+        <p:nvCxnSpPr>
+          <p:cNvPr id="66" name="Elbow Connector 307"/>
+          <p:cNvCxnSpPr>
+            <a:endCxn id="46" idx="0"/>
+          </p:cNvCxnSpPr>
+          <p:nvPr/>
+        </p:nvCxnSpPr>
+        <p:spPr>
+          <a:xfrm rot="16200000" flipH="1">
+            <a:off x="507148" y="797107"/>
+            <a:ext cx="360040" cy="295233"/>
+          </a:xfrm>
+          <a:prstGeom prst="bentConnector3">
+            <a:avLst>
+              <a:gd name="adj1" fmla="val 50000"/>
+            </a:avLst>
+          </a:prstGeom>
+          <a:ln>
+            <a:solidFill>
+              <a:schemeClr val="tx1"/>
+            </a:solidFill>
+            <a:prstDash val="dash"/>
           </a:ln>
         </p:spPr>
         <p:style>

</xml_diff>

<commit_message>
Servidor Central: Metodos para insertar en bd, redirigir mensajes, ejecutar aplicaciones, capturar mensajes a traves de la librería. Clase Nodo activo para chequear los nodos activos del SD ER: Agregado columna de instrucciones en la BD Librería de mensajes: Agregado metodo de eliminar mensaje.
</commit_message>
<xml_diff>
--- a/Documentos/er.pptx
+++ b/Documentos/er.pptx
@@ -289,7 +289,7 @@
             <a:fld id="{21B9F558-6522-4C10-99CA-66D81924EF51}" type="datetimeFigureOut">
               <a:rPr lang="es-VE" smtClean="0"/>
               <a:pPr/>
-              <a:t>7/12/13</a:t>
+              <a:t>7/16/13</a:t>
             </a:fld>
             <a:endParaRPr lang="es-VE"/>
           </a:p>
@@ -456,7 +456,7 @@
             <a:fld id="{21B9F558-6522-4C10-99CA-66D81924EF51}" type="datetimeFigureOut">
               <a:rPr lang="es-VE" smtClean="0"/>
               <a:pPr/>
-              <a:t>7/12/13</a:t>
+              <a:t>7/16/13</a:t>
             </a:fld>
             <a:endParaRPr lang="es-VE"/>
           </a:p>
@@ -633,7 +633,7 @@
             <a:fld id="{21B9F558-6522-4C10-99CA-66D81924EF51}" type="datetimeFigureOut">
               <a:rPr lang="es-VE" smtClean="0"/>
               <a:pPr/>
-              <a:t>7/12/13</a:t>
+              <a:t>7/16/13</a:t>
             </a:fld>
             <a:endParaRPr lang="es-VE"/>
           </a:p>
@@ -800,7 +800,7 @@
             <a:fld id="{21B9F558-6522-4C10-99CA-66D81924EF51}" type="datetimeFigureOut">
               <a:rPr lang="es-VE" smtClean="0"/>
               <a:pPr/>
-              <a:t>7/12/13</a:t>
+              <a:t>7/16/13</a:t>
             </a:fld>
             <a:endParaRPr lang="es-VE"/>
           </a:p>
@@ -1043,7 +1043,7 @@
             <a:fld id="{21B9F558-6522-4C10-99CA-66D81924EF51}" type="datetimeFigureOut">
               <a:rPr lang="es-VE" smtClean="0"/>
               <a:pPr/>
-              <a:t>7/12/13</a:t>
+              <a:t>7/16/13</a:t>
             </a:fld>
             <a:endParaRPr lang="es-VE"/>
           </a:p>
@@ -1328,7 +1328,7 @@
             <a:fld id="{21B9F558-6522-4C10-99CA-66D81924EF51}" type="datetimeFigureOut">
               <a:rPr lang="es-VE" smtClean="0"/>
               <a:pPr/>
-              <a:t>7/12/13</a:t>
+              <a:t>7/16/13</a:t>
             </a:fld>
             <a:endParaRPr lang="es-VE"/>
           </a:p>
@@ -1747,7 +1747,7 @@
             <a:fld id="{21B9F558-6522-4C10-99CA-66D81924EF51}" type="datetimeFigureOut">
               <a:rPr lang="es-VE" smtClean="0"/>
               <a:pPr/>
-              <a:t>7/12/13</a:t>
+              <a:t>7/16/13</a:t>
             </a:fld>
             <a:endParaRPr lang="es-VE"/>
           </a:p>
@@ -1862,7 +1862,7 @@
             <a:fld id="{21B9F558-6522-4C10-99CA-66D81924EF51}" type="datetimeFigureOut">
               <a:rPr lang="es-VE" smtClean="0"/>
               <a:pPr/>
-              <a:t>7/12/13</a:t>
+              <a:t>7/16/13</a:t>
             </a:fld>
             <a:endParaRPr lang="es-VE"/>
           </a:p>
@@ -1954,7 +1954,7 @@
             <a:fld id="{21B9F558-6522-4C10-99CA-66D81924EF51}" type="datetimeFigureOut">
               <a:rPr lang="es-VE" smtClean="0"/>
               <a:pPr/>
-              <a:t>7/12/13</a:t>
+              <a:t>7/16/13</a:t>
             </a:fld>
             <a:endParaRPr lang="es-VE"/>
           </a:p>
@@ -2228,7 +2228,7 @@
             <a:fld id="{21B9F558-6522-4C10-99CA-66D81924EF51}" type="datetimeFigureOut">
               <a:rPr lang="es-VE" smtClean="0"/>
               <a:pPr/>
-              <a:t>7/12/13</a:t>
+              <a:t>7/16/13</a:t>
             </a:fld>
             <a:endParaRPr lang="es-VE"/>
           </a:p>
@@ -2478,7 +2478,7 @@
             <a:fld id="{21B9F558-6522-4C10-99CA-66D81924EF51}" type="datetimeFigureOut">
               <a:rPr lang="es-VE" smtClean="0"/>
               <a:pPr/>
-              <a:t>7/12/13</a:t>
+              <a:t>7/16/13</a:t>
             </a:fld>
             <a:endParaRPr lang="es-VE"/>
           </a:p>
@@ -2688,7 +2688,7 @@
             <a:fld id="{21B9F558-6522-4C10-99CA-66D81924EF51}" type="datetimeFigureOut">
               <a:rPr lang="es-VE" smtClean="0"/>
               <a:pPr/>
-              <a:t>7/12/13</a:t>
+              <a:t>7/16/13</a:t>
             </a:fld>
             <a:endParaRPr lang="es-VE"/>
           </a:p>
@@ -3180,7 +3180,7 @@
         <p:spPr>
           <a:xfrm>
             <a:off x="2699792" y="2492896"/>
-            <a:ext cx="1512168" cy="864096"/>
+            <a:ext cx="1656184" cy="1008112"/>
           </a:xfrm>
           <a:prstGeom prst="roundRect">
             <a:avLst>
@@ -3275,6 +3275,29 @@
                 </a:solidFill>
               </a:rPr>
               <a:t>fechaActualización</a:t>
+            </a:r>
+            <a:endParaRPr lang="en-US" sz="1000" dirty="0" smtClean="0">
+              <a:solidFill>
+                <a:schemeClr val="tx1"/>
+              </a:solidFill>
+            </a:endParaRPr>
+          </a:p>
+          <a:p>
+            <a:r>
+              <a:rPr lang="en-US" sz="1000" dirty="0" smtClean="0">
+                <a:solidFill>
+                  <a:schemeClr val="tx1"/>
+                </a:solidFill>
+              </a:rPr>
+              <a:t>*</a:t>
+            </a:r>
+            <a:r>
+              <a:rPr lang="en-US" sz="1000" dirty="0" err="1" smtClean="0">
+                <a:solidFill>
+                  <a:schemeClr val="tx1"/>
+                </a:solidFill>
+              </a:rPr>
+              <a:t>instrucciones</a:t>
             </a:r>
             <a:endParaRPr lang="en-US" sz="1000" dirty="0" smtClean="0">
               <a:solidFill>
@@ -3325,13 +3348,15 @@
       <p:cxnSp>
         <p:nvCxnSpPr>
           <p:cNvPr id="15" name="14 Conector recto"/>
-          <p:cNvCxnSpPr/>
+          <p:cNvCxnSpPr>
+            <a:stCxn id="46" idx="3"/>
+          </p:cNvCxnSpPr>
           <p:nvPr/>
         </p:nvCxnSpPr>
         <p:spPr>
           <a:xfrm>
-            <a:off x="1619672" y="1628800"/>
-            <a:ext cx="648072" cy="0"/>
+            <a:off x="1644621" y="1628800"/>
+            <a:ext cx="623123" cy="0"/>
           </a:xfrm>
           <a:prstGeom prst="line">
             <a:avLst/>
@@ -3997,8 +4022,8 @@
         </p:nvCxnSpPr>
         <p:spPr>
           <a:xfrm>
-            <a:off x="3347864" y="1628800"/>
-            <a:ext cx="864096" cy="105732"/>
+            <a:off x="3419872" y="1628800"/>
+            <a:ext cx="792088" cy="105732"/>
           </a:xfrm>
           <a:prstGeom prst="bentConnector3">
             <a:avLst>
@@ -4031,14 +4056,14 @@
         <p:nvCxnSpPr>
           <p:cNvPr id="56" name="190 Conector angular"/>
           <p:cNvCxnSpPr>
-            <a:stCxn id="8" idx="0"/>
+            <a:stCxn id="59" idx="0"/>
           </p:cNvCxnSpPr>
           <p:nvPr/>
         </p:nvCxnSpPr>
         <p:spPr>
           <a:xfrm rot="16200000" flipV="1">
-            <a:off x="2969822" y="2006842"/>
-            <a:ext cx="864096" cy="108012"/>
+            <a:off x="3131840" y="1916832"/>
+            <a:ext cx="720080" cy="144016"/>
           </a:xfrm>
           <a:prstGeom prst="bentConnector3">
             <a:avLst>
@@ -4074,7 +4099,7 @@
         </p:nvSpPr>
         <p:spPr>
           <a:xfrm>
-            <a:off x="3275856" y="2348880"/>
+            <a:off x="3419872" y="2348880"/>
             <a:ext cx="288032" cy="144016"/>
           </a:xfrm>
           <a:prstGeom prst="triangle">
@@ -4263,8 +4288,8 @@
         </p:nvCxnSpPr>
         <p:spPr>
           <a:xfrm>
-            <a:off x="4211960" y="2780928"/>
-            <a:ext cx="936104" cy="156716"/>
+            <a:off x="4355976" y="2708920"/>
+            <a:ext cx="792088" cy="228724"/>
           </a:xfrm>
           <a:prstGeom prst="bentConnector3">
             <a:avLst>
@@ -6180,7 +6205,7 @@
         </p:nvSpPr>
         <p:spPr>
           <a:xfrm rot="5400000">
-            <a:off x="1511660" y="1520788"/>
+            <a:off x="1511660" y="1520791"/>
             <a:ext cx="360039" cy="144016"/>
           </a:xfrm>
           <a:prstGeom prst="triangle">

</xml_diff>

<commit_message>
Probando Servidor Central y Agente (Ya inserta información del agente). Agregado inicialización de atributos en el objeto de tipo InformacionAgente. Arreglado los scripts de creates, drops e inserts de la bd. Empezando el desarrollo del servidor central en el Documento de TomoFinal. Arreglado error del idProceso en el agente.
</commit_message>
<xml_diff>
--- a/Documentos/er.pptx
+++ b/Documentos/er.pptx
@@ -289,7 +289,7 @@
             <a:fld id="{21B9F558-6522-4C10-99CA-66D81924EF51}" type="datetimeFigureOut">
               <a:rPr lang="es-VE" smtClean="0"/>
               <a:pPr/>
-              <a:t>7/16/13</a:t>
+              <a:t>7/17/13</a:t>
             </a:fld>
             <a:endParaRPr lang="es-VE"/>
           </a:p>
@@ -456,7 +456,7 @@
             <a:fld id="{21B9F558-6522-4C10-99CA-66D81924EF51}" type="datetimeFigureOut">
               <a:rPr lang="es-VE" smtClean="0"/>
               <a:pPr/>
-              <a:t>7/16/13</a:t>
+              <a:t>7/17/13</a:t>
             </a:fld>
             <a:endParaRPr lang="es-VE"/>
           </a:p>
@@ -633,7 +633,7 @@
             <a:fld id="{21B9F558-6522-4C10-99CA-66D81924EF51}" type="datetimeFigureOut">
               <a:rPr lang="es-VE" smtClean="0"/>
               <a:pPr/>
-              <a:t>7/16/13</a:t>
+              <a:t>7/17/13</a:t>
             </a:fld>
             <a:endParaRPr lang="es-VE"/>
           </a:p>
@@ -800,7 +800,7 @@
             <a:fld id="{21B9F558-6522-4C10-99CA-66D81924EF51}" type="datetimeFigureOut">
               <a:rPr lang="es-VE" smtClean="0"/>
               <a:pPr/>
-              <a:t>7/16/13</a:t>
+              <a:t>7/17/13</a:t>
             </a:fld>
             <a:endParaRPr lang="es-VE"/>
           </a:p>
@@ -1043,7 +1043,7 @@
             <a:fld id="{21B9F558-6522-4C10-99CA-66D81924EF51}" type="datetimeFigureOut">
               <a:rPr lang="es-VE" smtClean="0"/>
               <a:pPr/>
-              <a:t>7/16/13</a:t>
+              <a:t>7/17/13</a:t>
             </a:fld>
             <a:endParaRPr lang="es-VE"/>
           </a:p>
@@ -1328,7 +1328,7 @@
             <a:fld id="{21B9F558-6522-4C10-99CA-66D81924EF51}" type="datetimeFigureOut">
               <a:rPr lang="es-VE" smtClean="0"/>
               <a:pPr/>
-              <a:t>7/16/13</a:t>
+              <a:t>7/17/13</a:t>
             </a:fld>
             <a:endParaRPr lang="es-VE"/>
           </a:p>
@@ -1747,7 +1747,7 @@
             <a:fld id="{21B9F558-6522-4C10-99CA-66D81924EF51}" type="datetimeFigureOut">
               <a:rPr lang="es-VE" smtClean="0"/>
               <a:pPr/>
-              <a:t>7/16/13</a:t>
+              <a:t>7/17/13</a:t>
             </a:fld>
             <a:endParaRPr lang="es-VE"/>
           </a:p>
@@ -1862,7 +1862,7 @@
             <a:fld id="{21B9F558-6522-4C10-99CA-66D81924EF51}" type="datetimeFigureOut">
               <a:rPr lang="es-VE" smtClean="0"/>
               <a:pPr/>
-              <a:t>7/16/13</a:t>
+              <a:t>7/17/13</a:t>
             </a:fld>
             <a:endParaRPr lang="es-VE"/>
           </a:p>
@@ -1954,7 +1954,7 @@
             <a:fld id="{21B9F558-6522-4C10-99CA-66D81924EF51}" type="datetimeFigureOut">
               <a:rPr lang="es-VE" smtClean="0"/>
               <a:pPr/>
-              <a:t>7/16/13</a:t>
+              <a:t>7/17/13</a:t>
             </a:fld>
             <a:endParaRPr lang="es-VE"/>
           </a:p>
@@ -2228,7 +2228,7 @@
             <a:fld id="{21B9F558-6522-4C10-99CA-66D81924EF51}" type="datetimeFigureOut">
               <a:rPr lang="es-VE" smtClean="0"/>
               <a:pPr/>
-              <a:t>7/16/13</a:t>
+              <a:t>7/17/13</a:t>
             </a:fld>
             <a:endParaRPr lang="es-VE"/>
           </a:p>
@@ -2478,7 +2478,7 @@
             <a:fld id="{21B9F558-6522-4C10-99CA-66D81924EF51}" type="datetimeFigureOut">
               <a:rPr lang="es-VE" smtClean="0"/>
               <a:pPr/>
-              <a:t>7/16/13</a:t>
+              <a:t>7/17/13</a:t>
             </a:fld>
             <a:endParaRPr lang="es-VE"/>
           </a:p>
@@ -2688,7 +2688,7 @@
             <a:fld id="{21B9F558-6522-4C10-99CA-66D81924EF51}" type="datetimeFigureOut">
               <a:rPr lang="es-VE" smtClean="0"/>
               <a:pPr/>
-              <a:t>7/16/13</a:t>
+              <a:t>7/17/13</a:t>
             </a:fld>
             <a:endParaRPr lang="es-VE"/>
           </a:p>
@@ -5282,7 +5282,15 @@
                   <a:schemeClr val="tx1"/>
                 </a:solidFill>
               </a:rPr>
-              <a:t>puertos_disponibles</a:t>
+              <a:t>puertos</a:t>
+            </a:r>
+            <a:r>
+              <a:rPr lang="en-US" sz="1000" dirty="0" err="1" smtClean="0">
+                <a:solidFill>
+                  <a:schemeClr val="tx1"/>
+                </a:solidFill>
+              </a:rPr>
+              <a:t>EnUso</a:t>
             </a:r>
             <a:endParaRPr lang="en-US" sz="1000" dirty="0" smtClean="0">
               <a:solidFill>

</xml_diff>

<commit_message>
Módulo de Gestión: Se realizan todas las operaciones en la misma página de gestión, los archivos (ejecutables o imágenes) se realizan en una página nueva que permite subir el archivo a un directorio predeterminado. Falta colocar la sesión para permitir que un usuario loqueado pueda realizar las operaciones. Módulo de Ciclo de Vida: Agregada las operaciones de detener un nodo y enviar un mensaje particular. Se puede observar los escenarios de una aplicación particular mediante una página que se abre al hacer click en el escenario particular. Creates SQL: Cambio en la FK de la entidad E_N, ahora solo depende del ejecutable, la tabla ejecutable posee la clave foranea de los nodos. Scripts Aplicación Web: Agregada una carpeta scripts con todos los .js que posee la aplicación web. Servidor Central: Agregado eliminar un nodo de la lista de nodos al momento de eliminar una aplicación determinada.
</commit_message>
<xml_diff>
--- a/Documentos/er.pptx
+++ b/Documentos/er.pptx
@@ -289,7 +289,7 @@
             <a:fld id="{21B9F558-6522-4C10-99CA-66D81924EF51}" type="datetimeFigureOut">
               <a:rPr lang="es-VE" smtClean="0"/>
               <a:pPr/>
-              <a:t>7/17/13</a:t>
+              <a:t>8/8/13</a:t>
             </a:fld>
             <a:endParaRPr lang="es-VE"/>
           </a:p>
@@ -456,7 +456,7 @@
             <a:fld id="{21B9F558-6522-4C10-99CA-66D81924EF51}" type="datetimeFigureOut">
               <a:rPr lang="es-VE" smtClean="0"/>
               <a:pPr/>
-              <a:t>7/17/13</a:t>
+              <a:t>8/8/13</a:t>
             </a:fld>
             <a:endParaRPr lang="es-VE"/>
           </a:p>
@@ -633,7 +633,7 @@
             <a:fld id="{21B9F558-6522-4C10-99CA-66D81924EF51}" type="datetimeFigureOut">
               <a:rPr lang="es-VE" smtClean="0"/>
               <a:pPr/>
-              <a:t>7/17/13</a:t>
+              <a:t>8/8/13</a:t>
             </a:fld>
             <a:endParaRPr lang="es-VE"/>
           </a:p>
@@ -800,7 +800,7 @@
             <a:fld id="{21B9F558-6522-4C10-99CA-66D81924EF51}" type="datetimeFigureOut">
               <a:rPr lang="es-VE" smtClean="0"/>
               <a:pPr/>
-              <a:t>7/17/13</a:t>
+              <a:t>8/8/13</a:t>
             </a:fld>
             <a:endParaRPr lang="es-VE"/>
           </a:p>
@@ -1043,7 +1043,7 @@
             <a:fld id="{21B9F558-6522-4C10-99CA-66D81924EF51}" type="datetimeFigureOut">
               <a:rPr lang="es-VE" smtClean="0"/>
               <a:pPr/>
-              <a:t>7/17/13</a:t>
+              <a:t>8/8/13</a:t>
             </a:fld>
             <a:endParaRPr lang="es-VE"/>
           </a:p>
@@ -1328,7 +1328,7 @@
             <a:fld id="{21B9F558-6522-4C10-99CA-66D81924EF51}" type="datetimeFigureOut">
               <a:rPr lang="es-VE" smtClean="0"/>
               <a:pPr/>
-              <a:t>7/17/13</a:t>
+              <a:t>8/8/13</a:t>
             </a:fld>
             <a:endParaRPr lang="es-VE"/>
           </a:p>
@@ -1747,7 +1747,7 @@
             <a:fld id="{21B9F558-6522-4C10-99CA-66D81924EF51}" type="datetimeFigureOut">
               <a:rPr lang="es-VE" smtClean="0"/>
               <a:pPr/>
-              <a:t>7/17/13</a:t>
+              <a:t>8/8/13</a:t>
             </a:fld>
             <a:endParaRPr lang="es-VE"/>
           </a:p>
@@ -1862,7 +1862,7 @@
             <a:fld id="{21B9F558-6522-4C10-99CA-66D81924EF51}" type="datetimeFigureOut">
               <a:rPr lang="es-VE" smtClean="0"/>
               <a:pPr/>
-              <a:t>7/17/13</a:t>
+              <a:t>8/8/13</a:t>
             </a:fld>
             <a:endParaRPr lang="es-VE"/>
           </a:p>
@@ -1954,7 +1954,7 @@
             <a:fld id="{21B9F558-6522-4C10-99CA-66D81924EF51}" type="datetimeFigureOut">
               <a:rPr lang="es-VE" smtClean="0"/>
               <a:pPr/>
-              <a:t>7/17/13</a:t>
+              <a:t>8/8/13</a:t>
             </a:fld>
             <a:endParaRPr lang="es-VE"/>
           </a:p>
@@ -2228,7 +2228,7 @@
             <a:fld id="{21B9F558-6522-4C10-99CA-66D81924EF51}" type="datetimeFigureOut">
               <a:rPr lang="es-VE" smtClean="0"/>
               <a:pPr/>
-              <a:t>7/17/13</a:t>
+              <a:t>8/8/13</a:t>
             </a:fld>
             <a:endParaRPr lang="es-VE"/>
           </a:p>
@@ -2478,7 +2478,7 @@
             <a:fld id="{21B9F558-6522-4C10-99CA-66D81924EF51}" type="datetimeFigureOut">
               <a:rPr lang="es-VE" smtClean="0"/>
               <a:pPr/>
-              <a:t>7/17/13</a:t>
+              <a:t>8/8/13</a:t>
             </a:fld>
             <a:endParaRPr lang="es-VE"/>
           </a:p>
@@ -2688,7 +2688,7 @@
             <a:fld id="{21B9F558-6522-4C10-99CA-66D81924EF51}" type="datetimeFigureOut">
               <a:rPr lang="es-VE" smtClean="0"/>
               <a:pPr/>
-              <a:t>7/17/13</a:t>
+              <a:t>8/8/13</a:t>
             </a:fld>
             <a:endParaRPr lang="es-VE"/>
           </a:p>
@@ -4660,8 +4660,8 @@
         </p:nvSpPr>
         <p:spPr>
           <a:xfrm>
-            <a:off x="899592" y="4581128"/>
-            <a:ext cx="1296144" cy="936104"/>
+            <a:off x="467544" y="2924944"/>
+            <a:ext cx="1296144" cy="1008112"/>
           </a:xfrm>
           <a:prstGeom prst="roundRect">
             <a:avLst>
@@ -5118,7 +5118,7 @@
         </p:nvSpPr>
         <p:spPr>
           <a:xfrm>
-            <a:off x="-18348" y="2420888"/>
+            <a:off x="539552" y="5157192"/>
             <a:ext cx="1763688" cy="1584176"/>
           </a:xfrm>
           <a:prstGeom prst="roundRect">
@@ -5282,15 +5282,7 @@
                   <a:schemeClr val="tx1"/>
                 </a:solidFill>
               </a:rPr>
-              <a:t>puertos</a:t>
-            </a:r>
-            <a:r>
-              <a:rPr lang="en-US" sz="1000" dirty="0" err="1" smtClean="0">
-                <a:solidFill>
-                  <a:schemeClr val="tx1"/>
-                </a:solidFill>
-              </a:rPr>
-              <a:t>EnUso</a:t>
+              <a:t>puertosEnUso</a:t>
             </a:r>
             <a:endParaRPr lang="en-US" sz="1000" dirty="0" smtClean="0">
               <a:solidFill>
@@ -5370,18 +5362,18 @@
       <p:cxnSp>
         <p:nvCxnSpPr>
           <p:cNvPr id="70" name="190 Conector angular"/>
-          <p:cNvCxnSpPr>
-            <a:stCxn id="71" idx="0"/>
-          </p:cNvCxnSpPr>
+          <p:cNvCxnSpPr/>
           <p:nvPr/>
         </p:nvCxnSpPr>
         <p:spPr>
           <a:xfrm rot="5400000">
-            <a:off x="3099347" y="4980876"/>
-            <a:ext cx="208814" cy="575871"/>
-          </a:xfrm>
-          <a:prstGeom prst="bentConnector2">
-            <a:avLst/>
+            <a:off x="503548" y="2384884"/>
+            <a:ext cx="648072" cy="1"/>
+          </a:xfrm>
+          <a:prstGeom prst="bentConnector3">
+            <a:avLst>
+              <a:gd name="adj1" fmla="val 50000"/>
+            </a:avLst>
           </a:prstGeom>
           <a:ln>
             <a:solidFill>
@@ -5412,7 +5404,7 @@
         </p:nvSpPr>
         <p:spPr>
           <a:xfrm rot="10976778">
-            <a:off x="3351374" y="5020483"/>
+            <a:off x="687077" y="2140162"/>
             <a:ext cx="288032" cy="144016"/>
           </a:xfrm>
           <a:prstGeom prst="triangle">
@@ -5457,9 +5449,9 @@
           <p:nvPr/>
         </p:nvCxnSpPr>
         <p:spPr>
-          <a:xfrm>
-            <a:off x="2195736" y="5157192"/>
-            <a:ext cx="720080" cy="216024"/>
+          <a:xfrm rot="10800000">
+            <a:off x="827584" y="3933056"/>
+            <a:ext cx="648072" cy="180020"/>
           </a:xfrm>
           <a:prstGeom prst="bentConnector3">
             <a:avLst>
@@ -5501,7 +5493,7 @@
           </a:xfrm>
           <a:prstGeom prst="bentConnector3">
             <a:avLst>
-              <a:gd name="adj1" fmla="val 25506"/>
+              <a:gd name="adj1" fmla="val 17342"/>
             </a:avLst>
           </a:prstGeom>
           <a:ln>
@@ -5775,9 +5767,9 @@
           <p:nvPr/>
         </p:nvCxnSpPr>
         <p:spPr>
-          <a:xfrm rot="5400000">
-            <a:off x="359532" y="4257092"/>
-            <a:ext cx="792088" cy="288032"/>
+          <a:xfrm rot="5400000" flipH="1" flipV="1">
+            <a:off x="863590" y="4473118"/>
+            <a:ext cx="936100" cy="288032"/>
           </a:xfrm>
           <a:prstGeom prst="bentConnector3">
             <a:avLst>
@@ -5812,9 +5804,9 @@
           <p:nvPr/>
         </p:nvSpPr>
         <p:spPr>
-          <a:xfrm rot="10976778">
-            <a:off x="759085" y="4000114"/>
-            <a:ext cx="288032" cy="144016"/>
+          <a:xfrm rot="194940">
+            <a:off x="1049296" y="4952711"/>
+            <a:ext cx="413342" cy="212450"/>
           </a:xfrm>
           <a:prstGeom prst="triangle">
             <a:avLst/>
@@ -5854,18 +5846,18 @@
       <p:cxnSp>
         <p:nvCxnSpPr>
           <p:cNvPr id="81" name="Elbow Connector 307"/>
-          <p:cNvCxnSpPr/>
+          <p:cNvCxnSpPr>
+            <a:endCxn id="57" idx="0"/>
+          </p:cNvCxnSpPr>
           <p:nvPr/>
         </p:nvCxnSpPr>
         <p:spPr>
           <a:xfrm>
-            <a:off x="611560" y="4797152"/>
-            <a:ext cx="288032" cy="252028"/>
-          </a:xfrm>
-          <a:prstGeom prst="bentConnector3">
-            <a:avLst>
-              <a:gd name="adj1" fmla="val 50000"/>
-            </a:avLst>
+            <a:off x="755576" y="2636912"/>
+            <a:ext cx="360040" cy="288032"/>
+          </a:xfrm>
+          <a:prstGeom prst="bentConnector2">
+            <a:avLst/>
           </a:prstGeom>
           <a:ln>
             <a:solidFill>

</xml_diff>

<commit_message>
Aplicación Web: Arreglado en Ciclo de Vida de los nodos. Servidor Central: Arreglado error al insertar los mensajes entre los nodos. Librería de mensajes: Agregado constructor para iniciar la librería sin escuchar mensajes. Scripts BD: Arreglado mas inserts. Aplicaciones SD: Completada la aplicación Características de los SD.
</commit_message>
<xml_diff>
--- a/Documentos/er.pptx
+++ b/Documentos/er.pptx
@@ -289,7 +289,7 @@
             <a:fld id="{21B9F558-6522-4C10-99CA-66D81924EF51}" type="datetimeFigureOut">
               <a:rPr lang="es-VE" smtClean="0"/>
               <a:pPr/>
-              <a:t>8/8/13</a:t>
+              <a:t>9/27/13</a:t>
             </a:fld>
             <a:endParaRPr lang="es-VE"/>
           </a:p>
@@ -456,7 +456,7 @@
             <a:fld id="{21B9F558-6522-4C10-99CA-66D81924EF51}" type="datetimeFigureOut">
               <a:rPr lang="es-VE" smtClean="0"/>
               <a:pPr/>
-              <a:t>8/8/13</a:t>
+              <a:t>9/27/13</a:t>
             </a:fld>
             <a:endParaRPr lang="es-VE"/>
           </a:p>
@@ -633,7 +633,7 @@
             <a:fld id="{21B9F558-6522-4C10-99CA-66D81924EF51}" type="datetimeFigureOut">
               <a:rPr lang="es-VE" smtClean="0"/>
               <a:pPr/>
-              <a:t>8/8/13</a:t>
+              <a:t>9/27/13</a:t>
             </a:fld>
             <a:endParaRPr lang="es-VE"/>
           </a:p>
@@ -800,7 +800,7 @@
             <a:fld id="{21B9F558-6522-4C10-99CA-66D81924EF51}" type="datetimeFigureOut">
               <a:rPr lang="es-VE" smtClean="0"/>
               <a:pPr/>
-              <a:t>8/8/13</a:t>
+              <a:t>9/27/13</a:t>
             </a:fld>
             <a:endParaRPr lang="es-VE"/>
           </a:p>
@@ -1043,7 +1043,7 @@
             <a:fld id="{21B9F558-6522-4C10-99CA-66D81924EF51}" type="datetimeFigureOut">
               <a:rPr lang="es-VE" smtClean="0"/>
               <a:pPr/>
-              <a:t>8/8/13</a:t>
+              <a:t>9/27/13</a:t>
             </a:fld>
             <a:endParaRPr lang="es-VE"/>
           </a:p>
@@ -1328,7 +1328,7 @@
             <a:fld id="{21B9F558-6522-4C10-99CA-66D81924EF51}" type="datetimeFigureOut">
               <a:rPr lang="es-VE" smtClean="0"/>
               <a:pPr/>
-              <a:t>8/8/13</a:t>
+              <a:t>9/27/13</a:t>
             </a:fld>
             <a:endParaRPr lang="es-VE"/>
           </a:p>
@@ -1747,7 +1747,7 @@
             <a:fld id="{21B9F558-6522-4C10-99CA-66D81924EF51}" type="datetimeFigureOut">
               <a:rPr lang="es-VE" smtClean="0"/>
               <a:pPr/>
-              <a:t>8/8/13</a:t>
+              <a:t>9/27/13</a:t>
             </a:fld>
             <a:endParaRPr lang="es-VE"/>
           </a:p>
@@ -1862,7 +1862,7 @@
             <a:fld id="{21B9F558-6522-4C10-99CA-66D81924EF51}" type="datetimeFigureOut">
               <a:rPr lang="es-VE" smtClean="0"/>
               <a:pPr/>
-              <a:t>8/8/13</a:t>
+              <a:t>9/27/13</a:t>
             </a:fld>
             <a:endParaRPr lang="es-VE"/>
           </a:p>
@@ -1954,7 +1954,7 @@
             <a:fld id="{21B9F558-6522-4C10-99CA-66D81924EF51}" type="datetimeFigureOut">
               <a:rPr lang="es-VE" smtClean="0"/>
               <a:pPr/>
-              <a:t>8/8/13</a:t>
+              <a:t>9/27/13</a:t>
             </a:fld>
             <a:endParaRPr lang="es-VE"/>
           </a:p>
@@ -2228,7 +2228,7 @@
             <a:fld id="{21B9F558-6522-4C10-99CA-66D81924EF51}" type="datetimeFigureOut">
               <a:rPr lang="es-VE" smtClean="0"/>
               <a:pPr/>
-              <a:t>8/8/13</a:t>
+              <a:t>9/27/13</a:t>
             </a:fld>
             <a:endParaRPr lang="es-VE"/>
           </a:p>
@@ -2478,7 +2478,7 @@
             <a:fld id="{21B9F558-6522-4C10-99CA-66D81924EF51}" type="datetimeFigureOut">
               <a:rPr lang="es-VE" smtClean="0"/>
               <a:pPr/>
-              <a:t>8/8/13</a:t>
+              <a:t>9/27/13</a:t>
             </a:fld>
             <a:endParaRPr lang="es-VE"/>
           </a:p>
@@ -2688,7 +2688,7 @@
             <a:fld id="{21B9F558-6522-4C10-99CA-66D81924EF51}" type="datetimeFigureOut">
               <a:rPr lang="es-VE" smtClean="0"/>
               <a:pPr/>
-              <a:t>8/8/13</a:t>
+              <a:t>9/27/13</a:t>
             </a:fld>
             <a:endParaRPr lang="es-VE"/>
           </a:p>
@@ -5751,6 +5751,31 @@
                 </a:solidFill>
               </a:rPr>
               <a:t>ipDestino</a:t>
+            </a:r>
+            <a:r>
+              <a:rPr lang="en-US" sz="1000" smtClean="0">
+                <a:solidFill>
+                  <a:schemeClr val="tx1"/>
+                </a:solidFill>
+              </a:rPr>
+              <a:t> </a:t>
+            </a:r>
+            <a:r>
+              <a:rPr lang="en-US" sz="1000" smtClean="0">
+                <a:solidFill>
+                  <a:schemeClr val="tx1"/>
+                </a:solidFill>
+                <a:sym typeface="Wingdings"/>
+              </a:rPr>
+              <a:t> </a:t>
+            </a:r>
+            <a:r>
+              <a:rPr lang="en-US" sz="1000" smtClean="0">
+                <a:solidFill>
+                  <a:schemeClr val="tx1"/>
+                </a:solidFill>
+              </a:rPr>
+              <a:t>NOVA</a:t>
             </a:r>
             <a:endParaRPr lang="en-US" sz="1000" dirty="0" smtClean="0">
               <a:solidFill>

</xml_diff>

<commit_message>
Scripts SQL: Eliminadas tablas de Mensaje entre nodos y renombradas las tablas E_E a Ejecutable_Evento y E_N a Informacion_Ejecutable... Servidor Central: Agregado método de comprobar conexión hacia el módulo de monitoreo y quitando métodos de insertarEnBd... Aplicación Web: Funcionamiento del agente de configuración. Al hacer click en el botón Información se muestra una pantalla con los datos recolectados por el agente de configuración para ese nodo. Agente de Configuración: Agregado método de comprobar conexión del servidor central para enviar la información.
</commit_message>
<xml_diff>
--- a/Documentos/er.pptx
+++ b/Documentos/er.pptx
@@ -289,7 +289,7 @@
             <a:fld id="{21B9F558-6522-4C10-99CA-66D81924EF51}" type="datetimeFigureOut">
               <a:rPr lang="es-VE" smtClean="0"/>
               <a:pPr/>
-              <a:t>9/27/13</a:t>
+              <a:t>11/2/13</a:t>
             </a:fld>
             <a:endParaRPr lang="es-VE"/>
           </a:p>
@@ -456,7 +456,7 @@
             <a:fld id="{21B9F558-6522-4C10-99CA-66D81924EF51}" type="datetimeFigureOut">
               <a:rPr lang="es-VE" smtClean="0"/>
               <a:pPr/>
-              <a:t>9/27/13</a:t>
+              <a:t>11/2/13</a:t>
             </a:fld>
             <a:endParaRPr lang="es-VE"/>
           </a:p>
@@ -633,7 +633,7 @@
             <a:fld id="{21B9F558-6522-4C10-99CA-66D81924EF51}" type="datetimeFigureOut">
               <a:rPr lang="es-VE" smtClean="0"/>
               <a:pPr/>
-              <a:t>9/27/13</a:t>
+              <a:t>11/2/13</a:t>
             </a:fld>
             <a:endParaRPr lang="es-VE"/>
           </a:p>
@@ -800,7 +800,7 @@
             <a:fld id="{21B9F558-6522-4C10-99CA-66D81924EF51}" type="datetimeFigureOut">
               <a:rPr lang="es-VE" smtClean="0"/>
               <a:pPr/>
-              <a:t>9/27/13</a:t>
+              <a:t>11/2/13</a:t>
             </a:fld>
             <a:endParaRPr lang="es-VE"/>
           </a:p>
@@ -1043,7 +1043,7 @@
             <a:fld id="{21B9F558-6522-4C10-99CA-66D81924EF51}" type="datetimeFigureOut">
               <a:rPr lang="es-VE" smtClean="0"/>
               <a:pPr/>
-              <a:t>9/27/13</a:t>
+              <a:t>11/2/13</a:t>
             </a:fld>
             <a:endParaRPr lang="es-VE"/>
           </a:p>
@@ -1328,7 +1328,7 @@
             <a:fld id="{21B9F558-6522-4C10-99CA-66D81924EF51}" type="datetimeFigureOut">
               <a:rPr lang="es-VE" smtClean="0"/>
               <a:pPr/>
-              <a:t>9/27/13</a:t>
+              <a:t>11/2/13</a:t>
             </a:fld>
             <a:endParaRPr lang="es-VE"/>
           </a:p>
@@ -1747,7 +1747,7 @@
             <a:fld id="{21B9F558-6522-4C10-99CA-66D81924EF51}" type="datetimeFigureOut">
               <a:rPr lang="es-VE" smtClean="0"/>
               <a:pPr/>
-              <a:t>9/27/13</a:t>
+              <a:t>11/2/13</a:t>
             </a:fld>
             <a:endParaRPr lang="es-VE"/>
           </a:p>
@@ -1862,7 +1862,7 @@
             <a:fld id="{21B9F558-6522-4C10-99CA-66D81924EF51}" type="datetimeFigureOut">
               <a:rPr lang="es-VE" smtClean="0"/>
               <a:pPr/>
-              <a:t>9/27/13</a:t>
+              <a:t>11/2/13</a:t>
             </a:fld>
             <a:endParaRPr lang="es-VE"/>
           </a:p>
@@ -1954,7 +1954,7 @@
             <a:fld id="{21B9F558-6522-4C10-99CA-66D81924EF51}" type="datetimeFigureOut">
               <a:rPr lang="es-VE" smtClean="0"/>
               <a:pPr/>
-              <a:t>9/27/13</a:t>
+              <a:t>11/2/13</a:t>
             </a:fld>
             <a:endParaRPr lang="es-VE"/>
           </a:p>
@@ -2228,7 +2228,7 @@
             <a:fld id="{21B9F558-6522-4C10-99CA-66D81924EF51}" type="datetimeFigureOut">
               <a:rPr lang="es-VE" smtClean="0"/>
               <a:pPr/>
-              <a:t>9/27/13</a:t>
+              <a:t>11/2/13</a:t>
             </a:fld>
             <a:endParaRPr lang="es-VE"/>
           </a:p>
@@ -2478,7 +2478,7 @@
             <a:fld id="{21B9F558-6522-4C10-99CA-66D81924EF51}" type="datetimeFigureOut">
               <a:rPr lang="es-VE" smtClean="0"/>
               <a:pPr/>
-              <a:t>9/27/13</a:t>
+              <a:t>11/2/13</a:t>
             </a:fld>
             <a:endParaRPr lang="es-VE"/>
           </a:p>
@@ -2688,7 +2688,7 @@
             <a:fld id="{21B9F558-6522-4C10-99CA-66D81924EF51}" type="datetimeFigureOut">
               <a:rPr lang="es-VE" smtClean="0"/>
               <a:pPr/>
-              <a:t>9/27/13</a:t>
+              <a:t>11/2/13</a:t>
             </a:fld>
             <a:endParaRPr lang="es-VE"/>
           </a:p>
@@ -4660,7 +4660,7 @@
         </p:nvSpPr>
         <p:spPr>
           <a:xfrm>
-            <a:off x="467544" y="2924944"/>
+            <a:off x="827584" y="2924944"/>
             <a:ext cx="1296144" cy="1008112"/>
           </a:xfrm>
           <a:prstGeom prst="roundRect">
@@ -4877,7 +4877,7 @@
         </p:nvSpPr>
         <p:spPr>
           <a:xfrm>
-            <a:off x="6948264" y="3717032"/>
+            <a:off x="1763688" y="5805264"/>
             <a:ext cx="1440160" cy="792088"/>
           </a:xfrm>
           <a:prstGeom prst="roundRect">
@@ -4998,7 +4998,7 @@
         <p:spPr>
           <a:xfrm>
             <a:off x="2771800" y="4221088"/>
-            <a:ext cx="1440160" cy="792088"/>
+            <a:ext cx="1656184" cy="792088"/>
           </a:xfrm>
           <a:prstGeom prst="roundRect">
             <a:avLst>
@@ -5031,13 +5031,18 @@
           <a:p>
             <a:pPr algn="ctr"/>
             <a:r>
-              <a:rPr lang="en-US" sz="1000" b="1" dirty="0" smtClean="0">
-                <a:solidFill>
-                  <a:schemeClr val="tx1"/>
-                </a:solidFill>
-              </a:rPr>
-              <a:t>E_N</a:t>
-            </a:r>
+              <a:rPr lang="en-US" sz="1000" b="1" dirty="0" err="1" smtClean="0">
+                <a:solidFill>
+                  <a:schemeClr val="tx1"/>
+                </a:solidFill>
+              </a:rPr>
+              <a:t>Informacion_Ejecutable</a:t>
+            </a:r>
+            <a:endParaRPr lang="en-US" sz="1000" b="1" dirty="0" smtClean="0">
+              <a:solidFill>
+                <a:schemeClr val="tx1"/>
+              </a:solidFill>
+            </a:endParaRPr>
           </a:p>
           <a:p>
             <a:r>
@@ -5102,255 +5107,6 @@
               </a:rPr>
               <a:t>id_Proceso</a:t>
             </a:r>
-            <a:endParaRPr lang="en-US" sz="1000" dirty="0" smtClean="0">
-              <a:solidFill>
-                <a:schemeClr val="tx1"/>
-              </a:solidFill>
-            </a:endParaRPr>
-          </a:p>
-        </p:txBody>
-      </p:sp>
-      <p:sp>
-        <p:nvSpPr>
-          <p:cNvPr id="50" name="59 Rectángulo redondeado"/>
-          <p:cNvSpPr/>
-          <p:nvPr/>
-        </p:nvSpPr>
-        <p:spPr>
-          <a:xfrm>
-            <a:off x="539552" y="5157192"/>
-            <a:ext cx="1763688" cy="1584176"/>
-          </a:xfrm>
-          <a:prstGeom prst="roundRect">
-            <a:avLst>
-              <a:gd name="adj" fmla="val 22949"/>
-            </a:avLst>
-          </a:prstGeom>
-          <a:solidFill>
-            <a:schemeClr val="bg1"/>
-          </a:solidFill>
-        </p:spPr>
-        <p:style>
-          <a:lnRef idx="2">
-            <a:schemeClr val="accent1">
-              <a:shade val="50000"/>
-            </a:schemeClr>
-          </a:lnRef>
-          <a:fillRef idx="1">
-            <a:schemeClr val="accent1"/>
-          </a:fillRef>
-          <a:effectRef idx="0">
-            <a:schemeClr val="accent1"/>
-          </a:effectRef>
-          <a:fontRef idx="minor">
-            <a:schemeClr val="lt1"/>
-          </a:fontRef>
-        </p:style>
-        <p:txBody>
-          <a:bodyPr rtlCol="0" anchor="t"/>
-          <a:lstStyle/>
-          <a:p>
-            <a:pPr algn="ctr"/>
-            <a:r>
-              <a:rPr lang="en-US" sz="1000" b="1" dirty="0" err="1" smtClean="0">
-                <a:solidFill>
-                  <a:schemeClr val="tx1"/>
-                </a:solidFill>
-              </a:rPr>
-              <a:t>MensajesAgente</a:t>
-            </a:r>
-            <a:endParaRPr lang="en-US" sz="1000" b="1" dirty="0" smtClean="0">
-              <a:solidFill>
-                <a:schemeClr val="tx1"/>
-              </a:solidFill>
-            </a:endParaRPr>
-          </a:p>
-          <a:p>
-            <a:r>
-              <a:rPr lang="en-US" sz="1000" dirty="0" smtClean="0">
-                <a:solidFill>
-                  <a:schemeClr val="tx1"/>
-                </a:solidFill>
-              </a:rPr>
-              <a:t>*#id</a:t>
-            </a:r>
-          </a:p>
-          <a:p>
-            <a:r>
-              <a:rPr lang="en-US" sz="1000" dirty="0">
-                <a:solidFill>
-                  <a:schemeClr val="tx1"/>
-                </a:solidFill>
-              </a:rPr>
-              <a:t>*</a:t>
-            </a:r>
-            <a:r>
-              <a:rPr lang="en-US" sz="1000" dirty="0" err="1" smtClean="0">
-                <a:solidFill>
-                  <a:schemeClr val="tx1"/>
-                </a:solidFill>
-              </a:rPr>
-              <a:t>idProceso</a:t>
-            </a:r>
-            <a:endParaRPr lang="en-US" sz="1000" dirty="0" smtClean="0">
-              <a:solidFill>
-                <a:schemeClr val="tx1"/>
-              </a:solidFill>
-            </a:endParaRPr>
-          </a:p>
-          <a:p>
-            <a:r>
-              <a:rPr lang="en-US" sz="1000" dirty="0" smtClean="0">
-                <a:solidFill>
-                  <a:schemeClr val="tx1"/>
-                </a:solidFill>
-              </a:rPr>
-              <a:t>*</a:t>
-            </a:r>
-            <a:r>
-              <a:rPr lang="en-US" sz="1000" dirty="0" err="1" smtClean="0">
-                <a:solidFill>
-                  <a:schemeClr val="tx1"/>
-                </a:solidFill>
-              </a:rPr>
-              <a:t>cantidadProcesos</a:t>
-            </a:r>
-            <a:endParaRPr lang="en-US" sz="1000" dirty="0" smtClean="0">
-              <a:solidFill>
-                <a:schemeClr val="tx1"/>
-              </a:solidFill>
-            </a:endParaRPr>
-          </a:p>
-          <a:p>
-            <a:r>
-              <a:rPr lang="en-US" sz="1000" dirty="0" smtClean="0">
-                <a:solidFill>
-                  <a:schemeClr val="tx1"/>
-                </a:solidFill>
-              </a:rPr>
-              <a:t>*</a:t>
-            </a:r>
-            <a:r>
-              <a:rPr lang="en-US" sz="1000" dirty="0" err="1" smtClean="0">
-                <a:solidFill>
-                  <a:schemeClr val="tx1"/>
-                </a:solidFill>
-              </a:rPr>
-              <a:t>memoriaDisponible</a:t>
-            </a:r>
-            <a:endParaRPr lang="en-US" sz="1000" dirty="0" smtClean="0">
-              <a:solidFill>
-                <a:schemeClr val="tx1"/>
-              </a:solidFill>
-            </a:endParaRPr>
-          </a:p>
-          <a:p>
-            <a:r>
-              <a:rPr lang="en-US" sz="1000" dirty="0" smtClean="0">
-                <a:solidFill>
-                  <a:schemeClr val="tx1"/>
-                </a:solidFill>
-              </a:rPr>
-              <a:t>*</a:t>
-            </a:r>
-            <a:r>
-              <a:rPr lang="en-US" sz="1000" dirty="0" err="1" smtClean="0">
-                <a:solidFill>
-                  <a:schemeClr val="tx1"/>
-                </a:solidFill>
-              </a:rPr>
-              <a:t>uso_cpu</a:t>
-            </a:r>
-            <a:endParaRPr lang="en-US" sz="1000" dirty="0" smtClean="0">
-              <a:solidFill>
-                <a:schemeClr val="tx1"/>
-              </a:solidFill>
-            </a:endParaRPr>
-          </a:p>
-          <a:p>
-            <a:r>
-              <a:rPr lang="en-US" sz="1000" dirty="0" smtClean="0">
-                <a:solidFill>
-                  <a:schemeClr val="tx1"/>
-                </a:solidFill>
-              </a:rPr>
-              <a:t>*</a:t>
-            </a:r>
-            <a:r>
-              <a:rPr lang="en-US" sz="1000" dirty="0" err="1" smtClean="0">
-                <a:solidFill>
-                  <a:schemeClr val="tx1"/>
-                </a:solidFill>
-              </a:rPr>
-              <a:t>puertosEnUso</a:t>
-            </a:r>
-            <a:endParaRPr lang="en-US" sz="1000" dirty="0" smtClean="0">
-              <a:solidFill>
-                <a:schemeClr val="tx1"/>
-              </a:solidFill>
-            </a:endParaRPr>
-          </a:p>
-          <a:p>
-            <a:r>
-              <a:rPr lang="en-US" sz="1000" dirty="0" smtClean="0">
-                <a:solidFill>
-                  <a:schemeClr val="tx1"/>
-                </a:solidFill>
-              </a:rPr>
-              <a:t>*</a:t>
-            </a:r>
-            <a:r>
-              <a:rPr lang="en-US" sz="1000" dirty="0" err="1" smtClean="0">
-                <a:solidFill>
-                  <a:schemeClr val="tx1"/>
-                </a:solidFill>
-              </a:rPr>
-              <a:t>nombreAplicaciónActual</a:t>
-            </a:r>
-            <a:endParaRPr lang="en-US" sz="1000" dirty="0" smtClean="0">
-              <a:solidFill>
-                <a:schemeClr val="tx1"/>
-              </a:solidFill>
-            </a:endParaRPr>
-          </a:p>
-          <a:p>
-            <a:r>
-              <a:rPr lang="en-US" sz="1000" dirty="0" smtClean="0">
-                <a:solidFill>
-                  <a:schemeClr val="tx1"/>
-                </a:solidFill>
-              </a:rPr>
-              <a:t>*</a:t>
-            </a:r>
-            <a:r>
-              <a:rPr lang="en-US" sz="1000" dirty="0" err="1" smtClean="0">
-                <a:solidFill>
-                  <a:schemeClr val="tx1"/>
-                </a:solidFill>
-              </a:rPr>
-              <a:t>estadoAplicación</a:t>
-            </a:r>
-            <a:endParaRPr lang="en-US" sz="1000" dirty="0" smtClean="0">
-              <a:solidFill>
-                <a:schemeClr val="tx1"/>
-              </a:solidFill>
-            </a:endParaRPr>
-          </a:p>
-          <a:p>
-            <a:endParaRPr lang="en-US" sz="1000" dirty="0" smtClean="0">
-              <a:solidFill>
-                <a:schemeClr val="tx1"/>
-              </a:solidFill>
-            </a:endParaRPr>
-          </a:p>
-          <a:p>
-            <a:endParaRPr lang="en-US" sz="1000" dirty="0" smtClean="0">
-              <a:solidFill>
-                <a:schemeClr val="tx1"/>
-              </a:solidFill>
-            </a:endParaRPr>
-          </a:p>
-          <a:p>
             <a:endParaRPr lang="en-US" sz="1000" dirty="0" smtClean="0">
               <a:solidFill>
                 <a:schemeClr val="tx1"/>
@@ -5442,44 +5198,6 @@
           </a:p>
         </p:txBody>
       </p:sp>
-      <p:cxnSp>
-        <p:nvCxnSpPr>
-          <p:cNvPr id="73" name="Elbow Connector 307"/>
-          <p:cNvCxnSpPr/>
-          <p:nvPr/>
-        </p:nvCxnSpPr>
-        <p:spPr>
-          <a:xfrm rot="10800000">
-            <a:off x="827584" y="3933056"/>
-            <a:ext cx="648072" cy="180020"/>
-          </a:xfrm>
-          <a:prstGeom prst="bentConnector3">
-            <a:avLst>
-              <a:gd name="adj1" fmla="val 50000"/>
-            </a:avLst>
-          </a:prstGeom>
-          <a:ln>
-            <a:solidFill>
-              <a:schemeClr val="tx1"/>
-            </a:solidFill>
-            <a:prstDash val="dash"/>
-          </a:ln>
-        </p:spPr>
-        <p:style>
-          <a:lnRef idx="1">
-            <a:schemeClr val="accent1"/>
-          </a:lnRef>
-          <a:fillRef idx="0">
-            <a:schemeClr val="accent1"/>
-          </a:fillRef>
-          <a:effectRef idx="0">
-            <a:schemeClr val="accent1"/>
-          </a:effectRef>
-          <a:fontRef idx="minor">
-            <a:schemeClr val="tx1"/>
-          </a:fontRef>
-        </p:style>
-      </p:cxnSp>
       <p:cxnSp>
         <p:nvCxnSpPr>
           <p:cNvPr id="74" name="Elbow Connector 307"/>
@@ -5528,8 +5246,8 @@
         </p:nvCxnSpPr>
         <p:spPr>
           <a:xfrm rot="16200000" flipV="1">
-            <a:off x="2699792" y="3429000"/>
-            <a:ext cx="576064" cy="1008112"/>
+            <a:off x="2753798" y="3374994"/>
+            <a:ext cx="576064" cy="1116124"/>
           </a:xfrm>
           <a:prstGeom prst="bentConnector2">
             <a:avLst/>
@@ -5601,16 +5319,54 @@
           </a:p>
         </p:txBody>
       </p:sp>
-      <p:sp>
-        <p:nvSpPr>
-          <p:cNvPr id="77" name="59 Rectángulo redondeado"/>
+      <p:cxnSp>
+        <p:nvCxnSpPr>
+          <p:cNvPr id="81" name="Elbow Connector 307"/>
+          <p:cNvCxnSpPr>
+            <a:endCxn id="57" idx="0"/>
+          </p:cNvCxnSpPr>
+          <p:nvPr/>
+        </p:nvCxnSpPr>
+        <p:spPr>
+          <a:xfrm>
+            <a:off x="827584" y="2636912"/>
+            <a:ext cx="648072" cy="288032"/>
+          </a:xfrm>
+          <a:prstGeom prst="bentConnector2">
+            <a:avLst/>
+          </a:prstGeom>
+          <a:ln>
+            <a:solidFill>
+              <a:schemeClr val="tx1"/>
+            </a:solidFill>
+            <a:prstDash val="dash"/>
+          </a:ln>
+        </p:spPr>
+        <p:style>
+          <a:lnRef idx="1">
+            <a:schemeClr val="accent1"/>
+          </a:lnRef>
+          <a:fillRef idx="0">
+            <a:schemeClr val="accent1"/>
+          </a:fillRef>
+          <a:effectRef idx="0">
+            <a:schemeClr val="accent1"/>
+          </a:effectRef>
+          <a:fontRef idx="minor">
+            <a:schemeClr val="tx1"/>
+          </a:fontRef>
+        </p:style>
+      </p:cxnSp>
+      <p:sp>
+        <p:nvSpPr>
+          <p:cNvPr id="46" name="59 Rectángulo redondeado"/>
           <p:cNvSpPr/>
           <p:nvPr/>
         </p:nvSpPr>
         <p:spPr>
           <a:xfrm>
-            <a:off x="4860032" y="5301208"/>
-            <a:ext cx="1944216" cy="1152128"/>
+            <a:off x="24949" y="1124744"/>
+            <a:ext cx="1619672" cy="1008112"/>
           </a:xfrm>
           <a:prstGeom prst="roundRect">
             <a:avLst>
@@ -5648,7 +5404,7 @@
                   <a:schemeClr val="tx1"/>
                 </a:solidFill>
               </a:rPr>
-              <a:t>MensajeEntreNodos</a:t>
+              <a:t>Ejecutable</a:t>
             </a:r>
             <a:endParaRPr lang="en-US" sz="1000" b="1" dirty="0" smtClean="0">
               <a:solidFill>
@@ -5681,7 +5437,7 @@
                   <a:schemeClr val="tx1"/>
                 </a:solidFill>
               </a:rPr>
-              <a:t>fecha</a:t>
+              <a:t>nombre</a:t>
             </a:r>
             <a:endParaRPr lang="en-US" sz="1000" dirty="0" smtClean="0">
               <a:solidFill>
@@ -5691,7 +5447,7 @@
           </a:p>
           <a:p>
             <a:r>
-              <a:rPr lang="en-US" sz="1000" dirty="0">
+              <a:rPr lang="en-US" sz="1000" dirty="0" smtClean="0">
                 <a:solidFill>
                   <a:schemeClr val="tx1"/>
                 </a:solidFill>
@@ -5704,22 +5460,15 @@
                   <a:schemeClr val="tx1"/>
                 </a:solidFill>
               </a:rPr>
-              <a:t>hora</a:t>
-            </a:r>
-            <a:endParaRPr lang="en-US" sz="1000" dirty="0" smtClean="0">
-              <a:solidFill>
-                <a:schemeClr val="tx1"/>
-              </a:solidFill>
-            </a:endParaRPr>
-          </a:p>
-          <a:p>
+              <a:t>tipo</a:t>
+            </a:r>
             <a:r>
               <a:rPr lang="en-US" sz="1000" dirty="0" smtClean="0">
                 <a:solidFill>
                   <a:schemeClr val="tx1"/>
                 </a:solidFill>
               </a:rPr>
-              <a:t>*</a:t>
+              <a:t> (</a:t>
             </a:r>
             <a:r>
               <a:rPr lang="en-US" sz="1000" dirty="0" err="1" smtClean="0">
@@ -5727,22 +5476,15 @@
                   <a:schemeClr val="tx1"/>
                 </a:solidFill>
               </a:rPr>
-              <a:t>mensaje</a:t>
-            </a:r>
-            <a:endParaRPr lang="en-US" sz="1000" dirty="0" smtClean="0">
-              <a:solidFill>
-                <a:schemeClr val="tx1"/>
-              </a:solidFill>
-            </a:endParaRPr>
-          </a:p>
-          <a:p>
+              <a:t>cliente</a:t>
+            </a:r>
             <a:r>
               <a:rPr lang="en-US" sz="1000" dirty="0" smtClean="0">
                 <a:solidFill>
                   <a:schemeClr val="tx1"/>
                 </a:solidFill>
               </a:rPr>
-              <a:t>*</a:t>
+              <a:t> / </a:t>
             </a:r>
             <a:r>
               <a:rPr lang="en-US" sz="1000" dirty="0" err="1" smtClean="0">
@@ -5750,56 +5492,92 @@
                   <a:schemeClr val="tx1"/>
                 </a:solidFill>
               </a:rPr>
-              <a:t>ipDestino</a:t>
-            </a:r>
-            <a:r>
-              <a:rPr lang="en-US" sz="1000" smtClean="0">
-                <a:solidFill>
-                  <a:schemeClr val="tx1"/>
-                </a:solidFill>
-              </a:rPr>
-              <a:t> </a:t>
-            </a:r>
-            <a:r>
-              <a:rPr lang="en-US" sz="1000" smtClean="0">
-                <a:solidFill>
-                  <a:schemeClr val="tx1"/>
-                </a:solidFill>
-                <a:sym typeface="Wingdings"/>
-              </a:rPr>
-              <a:t> </a:t>
-            </a:r>
-            <a:r>
-              <a:rPr lang="en-US" sz="1000" smtClean="0">
-                <a:solidFill>
-                  <a:schemeClr val="tx1"/>
-                </a:solidFill>
-              </a:rPr>
-              <a:t>NOVA</a:t>
-            </a:r>
-            <a:endParaRPr lang="en-US" sz="1000" dirty="0" smtClean="0">
-              <a:solidFill>
-                <a:schemeClr val="tx1"/>
-              </a:solidFill>
-            </a:endParaRPr>
+              <a:t>servidor</a:t>
+            </a:r>
+            <a:r>
+              <a:rPr lang="en-US" sz="1000" dirty="0" smtClean="0">
+                <a:solidFill>
+                  <a:schemeClr val="tx1"/>
+                </a:solidFill>
+              </a:rPr>
+              <a:t>)</a:t>
+            </a:r>
+          </a:p>
+          <a:p>
+            <a:r>
+              <a:rPr lang="en-US" sz="1000" dirty="0" smtClean="0">
+                <a:solidFill>
+                  <a:schemeClr val="tx1"/>
+                </a:solidFill>
+              </a:rPr>
+              <a:t>*path</a:t>
+            </a:r>
+          </a:p>
+        </p:txBody>
+      </p:sp>
+      <p:sp>
+        <p:nvSpPr>
+          <p:cNvPr id="51" name="35 Triángulo isósceles"/>
+          <p:cNvSpPr/>
+          <p:nvPr/>
+        </p:nvSpPr>
+        <p:spPr>
+          <a:xfrm rot="5400000">
+            <a:off x="1511660" y="1520791"/>
+            <a:ext cx="360039" cy="144016"/>
+          </a:xfrm>
+          <a:prstGeom prst="triangle">
+            <a:avLst>
+              <a:gd name="adj" fmla="val 57586"/>
+            </a:avLst>
+          </a:prstGeom>
+          <a:noFill/>
+          <a:ln w="9525" cmpd="sng">
+            <a:solidFill>
+              <a:schemeClr val="tx1"/>
+            </a:solidFill>
+          </a:ln>
+        </p:spPr>
+        <p:style>
+          <a:lnRef idx="2">
+            <a:schemeClr val="accent1">
+              <a:shade val="50000"/>
+            </a:schemeClr>
+          </a:lnRef>
+          <a:fillRef idx="1">
+            <a:schemeClr val="accent1"/>
+          </a:fillRef>
+          <a:effectRef idx="0">
+            <a:schemeClr val="accent1"/>
+          </a:effectRef>
+          <a:fontRef idx="minor">
+            <a:schemeClr val="lt1"/>
+          </a:fontRef>
+        </p:style>
+        <p:txBody>
+          <a:bodyPr rtlCol="0" anchor="ctr"/>
+          <a:lstStyle/>
+          <a:p>
+            <a:pPr algn="ctr"/>
+            <a:endParaRPr lang="es-VE"/>
           </a:p>
         </p:txBody>
       </p:sp>
       <p:cxnSp>
         <p:nvCxnSpPr>
-          <p:cNvPr id="79" name="190 Conector angular"/>
-          <p:cNvCxnSpPr/>
+          <p:cNvPr id="62" name="190 Conector angular"/>
+          <p:cNvCxnSpPr>
+            <a:stCxn id="4" idx="1"/>
+          </p:cNvCxnSpPr>
           <p:nvPr/>
         </p:nvCxnSpPr>
         <p:spPr>
-          <a:xfrm rot="5400000" flipH="1" flipV="1">
-            <a:off x="863590" y="4473118"/>
-            <a:ext cx="936100" cy="288032"/>
-          </a:xfrm>
-          <a:prstGeom prst="bentConnector3">
-            <a:avLst>
-              <a:gd name="adj1" fmla="val 50000"/>
-            </a:avLst>
+          <a:xfrm rot="10800000" flipV="1">
+            <a:off x="539552" y="432048"/>
+            <a:ext cx="360040" cy="404664"/>
+          </a:xfrm>
+          <a:prstGeom prst="bentConnector2">
+            <a:avLst/>
           </a:prstGeom>
           <a:ln>
             <a:solidFill>
@@ -5824,14 +5602,14 @@
       </p:cxnSp>
       <p:sp>
         <p:nvSpPr>
-          <p:cNvPr id="80" name="64 Triángulo isósceles"/>
+          <p:cNvPr id="63" name="64 Triángulo isósceles"/>
           <p:cNvSpPr/>
           <p:nvPr/>
         </p:nvSpPr>
         <p:spPr>
-          <a:xfrm rot="194940">
-            <a:off x="1049296" y="4952711"/>
-            <a:ext cx="413342" cy="212450"/>
+          <a:xfrm rot="16027436">
+            <a:off x="674800" y="345582"/>
+            <a:ext cx="305221" cy="128519"/>
           </a:xfrm>
           <a:prstGeom prst="triangle">
             <a:avLst/>
@@ -5870,52 +5648,16 @@
       </p:sp>
       <p:cxnSp>
         <p:nvCxnSpPr>
-          <p:cNvPr id="81" name="Elbow Connector 307"/>
+          <p:cNvPr id="66" name="Elbow Connector 307"/>
           <p:cNvCxnSpPr>
-            <a:endCxn id="57" idx="0"/>
+            <a:endCxn id="46" idx="0"/>
           </p:cNvCxnSpPr>
           <p:nvPr/>
         </p:nvCxnSpPr>
         <p:spPr>
-          <a:xfrm>
-            <a:off x="755576" y="2636912"/>
-            <a:ext cx="360040" cy="288032"/>
-          </a:xfrm>
-          <a:prstGeom prst="bentConnector2">
-            <a:avLst/>
-          </a:prstGeom>
-          <a:ln>
-            <a:solidFill>
-              <a:schemeClr val="tx1"/>
-            </a:solidFill>
-            <a:prstDash val="dash"/>
-          </a:ln>
-        </p:spPr>
-        <p:style>
-          <a:lnRef idx="1">
-            <a:schemeClr val="accent1"/>
-          </a:lnRef>
-          <a:fillRef idx="0">
-            <a:schemeClr val="accent1"/>
-          </a:fillRef>
-          <a:effectRef idx="0">
-            <a:schemeClr val="accent1"/>
-          </a:effectRef>
-          <a:fontRef idx="minor">
-            <a:schemeClr val="tx1"/>
-          </a:fontRef>
-        </p:style>
-      </p:cxnSp>
-      <p:cxnSp>
-        <p:nvCxnSpPr>
-          <p:cNvPr id="86" name="Elbow Connector 307"/>
-          <p:cNvCxnSpPr/>
-          <p:nvPr/>
-        </p:nvCxnSpPr>
-        <p:spPr>
-          <a:xfrm>
-            <a:off x="3851920" y="5013176"/>
-            <a:ext cx="504056" cy="288032"/>
+          <a:xfrm rot="16200000" flipH="1">
+            <a:off x="507148" y="797107"/>
+            <a:ext cx="360040" cy="295233"/>
           </a:xfrm>
           <a:prstGeom prst="bentConnector3">
             <a:avLst>
@@ -5946,14 +5688,224 @@
       </p:cxnSp>
       <p:cxnSp>
         <p:nvCxnSpPr>
-          <p:cNvPr id="87" name="190 Conector angular"/>
+          <p:cNvPr id="52" name="Elbow Connector 307"/>
           <p:cNvCxnSpPr/>
           <p:nvPr/>
         </p:nvCxnSpPr>
         <p:spPr>
-          <a:xfrm rot="16200000" flipV="1">
-            <a:off x="4211960" y="5445224"/>
-            <a:ext cx="504056" cy="216024"/>
+          <a:xfrm rot="16200000" flipH="1">
+            <a:off x="-648580" y="3104964"/>
+            <a:ext cx="2016224" cy="72008"/>
+          </a:xfrm>
+          <a:prstGeom prst="bentConnector3">
+            <a:avLst>
+              <a:gd name="adj1" fmla="val 50000"/>
+            </a:avLst>
+          </a:prstGeom>
+          <a:ln>
+            <a:solidFill>
+              <a:schemeClr val="tx1"/>
+            </a:solidFill>
+            <a:prstDash val="dash"/>
+          </a:ln>
+        </p:spPr>
+        <p:style>
+          <a:lnRef idx="1">
+            <a:schemeClr val="accent1"/>
+          </a:lnRef>
+          <a:fillRef idx="0">
+            <a:schemeClr val="accent1"/>
+          </a:fillRef>
+          <a:effectRef idx="0">
+            <a:schemeClr val="accent1"/>
+          </a:effectRef>
+          <a:fontRef idx="minor">
+            <a:schemeClr val="tx1"/>
+          </a:fontRef>
+        </p:style>
+      </p:cxnSp>
+      <p:sp>
+        <p:nvSpPr>
+          <p:cNvPr id="58" name="58 Triángulo isósceles"/>
+          <p:cNvSpPr/>
+          <p:nvPr/>
+        </p:nvSpPr>
+        <p:spPr>
+          <a:xfrm>
+            <a:off x="899592" y="4365104"/>
+            <a:ext cx="288032" cy="144016"/>
+          </a:xfrm>
+          <a:prstGeom prst="triangle">
+            <a:avLst/>
+          </a:prstGeom>
+          <a:noFill/>
+          <a:ln w="9525" cmpd="sng">
+            <a:solidFill>
+              <a:schemeClr val="tx1"/>
+            </a:solidFill>
+          </a:ln>
+        </p:spPr>
+        <p:style>
+          <a:lnRef idx="2">
+            <a:schemeClr val="accent1">
+              <a:shade val="50000"/>
+            </a:schemeClr>
+          </a:lnRef>
+          <a:fillRef idx="1">
+            <a:schemeClr val="accent1"/>
+          </a:fillRef>
+          <a:effectRef idx="0">
+            <a:schemeClr val="accent1"/>
+          </a:effectRef>
+          <a:fontRef idx="minor">
+            <a:schemeClr val="lt1"/>
+          </a:fontRef>
+        </p:style>
+        <p:txBody>
+          <a:bodyPr rtlCol="0" anchor="ctr"/>
+          <a:lstStyle/>
+          <a:p>
+            <a:pPr algn="ctr"/>
+            <a:endParaRPr lang="es-VE"/>
+          </a:p>
+        </p:txBody>
+      </p:sp>
+      <p:sp>
+        <p:nvSpPr>
+          <p:cNvPr id="67" name="59 Rectángulo redondeado"/>
+          <p:cNvSpPr/>
+          <p:nvPr/>
+        </p:nvSpPr>
+        <p:spPr>
+          <a:xfrm>
+            <a:off x="395536" y="4509120"/>
+            <a:ext cx="1440160" cy="792088"/>
+          </a:xfrm>
+          <a:prstGeom prst="roundRect">
+            <a:avLst>
+              <a:gd name="adj" fmla="val 22949"/>
+            </a:avLst>
+          </a:prstGeom>
+          <a:solidFill>
+            <a:schemeClr val="bg1"/>
+          </a:solidFill>
+        </p:spPr>
+        <p:style>
+          <a:lnRef idx="2">
+            <a:schemeClr val="accent1">
+              <a:shade val="50000"/>
+            </a:schemeClr>
+          </a:lnRef>
+          <a:fillRef idx="1">
+            <a:schemeClr val="accent1"/>
+          </a:fillRef>
+          <a:effectRef idx="0">
+            <a:schemeClr val="accent1"/>
+          </a:effectRef>
+          <a:fontRef idx="minor">
+            <a:schemeClr val="lt1"/>
+          </a:fontRef>
+        </p:style>
+        <p:txBody>
+          <a:bodyPr rtlCol="0" anchor="t"/>
+          <a:lstStyle/>
+          <a:p>
+            <a:pPr algn="ctr"/>
+            <a:r>
+              <a:rPr lang="en-US" sz="1000" b="1" smtClean="0">
+                <a:solidFill>
+                  <a:schemeClr val="tx1"/>
+                </a:solidFill>
+              </a:rPr>
+              <a:t>EJECUTABLE_EVENTO</a:t>
+            </a:r>
+            <a:endParaRPr lang="en-US" sz="1000" b="1" dirty="0" smtClean="0">
+              <a:solidFill>
+                <a:schemeClr val="tx1"/>
+              </a:solidFill>
+            </a:endParaRPr>
+          </a:p>
+          <a:p>
+            <a:r>
+              <a:rPr lang="en-US" sz="1000" dirty="0">
+                <a:solidFill>
+                  <a:schemeClr val="tx1"/>
+                </a:solidFill>
+              </a:rPr>
+              <a:t>#</a:t>
+            </a:r>
+            <a:r>
+              <a:rPr lang="en-US" sz="1000" dirty="0" err="1" smtClean="0">
+                <a:solidFill>
+                  <a:schemeClr val="tx1"/>
+                </a:solidFill>
+              </a:rPr>
+              <a:t>fecha_Deploy</a:t>
+            </a:r>
+            <a:endParaRPr lang="en-US" sz="1000" dirty="0" smtClean="0">
+              <a:solidFill>
+                <a:schemeClr val="tx1"/>
+              </a:solidFill>
+            </a:endParaRPr>
+          </a:p>
+          <a:p>
+            <a:r>
+              <a:rPr lang="en-US" sz="1000" dirty="0" smtClean="0">
+                <a:solidFill>
+                  <a:schemeClr val="tx1"/>
+                </a:solidFill>
+              </a:rPr>
+              <a:t>#</a:t>
+            </a:r>
+            <a:r>
+              <a:rPr lang="en-US" sz="1000" dirty="0" err="1" smtClean="0">
+                <a:solidFill>
+                  <a:schemeClr val="tx1"/>
+                </a:solidFill>
+              </a:rPr>
+              <a:t>hora_Deploy</a:t>
+            </a:r>
+            <a:endParaRPr lang="en-US" sz="1000" dirty="0" smtClean="0">
+              <a:solidFill>
+                <a:schemeClr val="tx1"/>
+              </a:solidFill>
+            </a:endParaRPr>
+          </a:p>
+          <a:p>
+            <a:r>
+              <a:rPr lang="en-US" sz="1000" dirty="0" smtClean="0">
+                <a:solidFill>
+                  <a:schemeClr val="tx1"/>
+                </a:solidFill>
+              </a:rPr>
+              <a:t>*</a:t>
+            </a:r>
+            <a:r>
+              <a:rPr lang="en-US" sz="1000" dirty="0" err="1" smtClean="0">
+                <a:solidFill>
+                  <a:schemeClr val="tx1"/>
+                </a:solidFill>
+              </a:rPr>
+              <a:t>id_Proceso</a:t>
+            </a:r>
+            <a:endParaRPr lang="en-US" sz="1000" dirty="0" smtClean="0">
+              <a:solidFill>
+                <a:schemeClr val="tx1"/>
+              </a:solidFill>
+            </a:endParaRPr>
+          </a:p>
+        </p:txBody>
+      </p:sp>
+      <p:cxnSp>
+        <p:nvCxnSpPr>
+          <p:cNvPr id="72" name="190 Conector angular"/>
+          <p:cNvCxnSpPr/>
+          <p:nvPr/>
+        </p:nvCxnSpPr>
+        <p:spPr>
+          <a:xfrm rot="5400000">
+            <a:off x="719572" y="5625244"/>
+            <a:ext cx="648072" cy="1"/>
           </a:xfrm>
           <a:prstGeom prst="bentConnector3">
             <a:avLst>
@@ -5983,13 +5935,13 @@
       </p:cxnSp>
       <p:sp>
         <p:nvSpPr>
-          <p:cNvPr id="88" name="64 Triángulo isósceles"/>
+          <p:cNvPr id="82" name="64 Triángulo isósceles"/>
           <p:cNvSpPr/>
           <p:nvPr/>
         </p:nvSpPr>
         <p:spPr>
-          <a:xfrm rot="16200000">
-            <a:off x="4644008" y="5733256"/>
+          <a:xfrm rot="10976778">
+            <a:off x="903101" y="5308514"/>
             <a:ext cx="288032" cy="144016"/>
           </a:xfrm>
           <a:prstGeom prst="triangle">
@@ -6029,14 +5981,14 @@
       </p:sp>
       <p:cxnSp>
         <p:nvCxnSpPr>
-          <p:cNvPr id="89" name="190 Conector angular"/>
+          <p:cNvPr id="84" name="190 Conector angular"/>
           <p:cNvCxnSpPr/>
           <p:nvPr/>
         </p:nvCxnSpPr>
         <p:spPr>
-          <a:xfrm rot="10800000">
-            <a:off x="4572000" y="5805264"/>
-            <a:ext cx="279648" cy="12700"/>
+          <a:xfrm rot="5400000">
+            <a:off x="893244" y="4365106"/>
+            <a:ext cx="294380" cy="6349"/>
           </a:xfrm>
           <a:prstGeom prst="bentConnector3">
             <a:avLst>
@@ -6064,232 +6016,27 @@
           </a:fontRef>
         </p:style>
       </p:cxnSp>
-      <p:sp>
-        <p:nvSpPr>
-          <p:cNvPr id="46" name="59 Rectángulo redondeado"/>
-          <p:cNvSpPr/>
-          <p:nvPr/>
-        </p:nvSpPr>
-        <p:spPr>
-          <a:xfrm>
-            <a:off x="24949" y="1124744"/>
-            <a:ext cx="1619672" cy="1008112"/>
-          </a:xfrm>
-          <a:prstGeom prst="roundRect">
-            <a:avLst>
-              <a:gd name="adj" fmla="val 22949"/>
-            </a:avLst>
-          </a:prstGeom>
-          <a:solidFill>
-            <a:schemeClr val="bg1"/>
-          </a:solidFill>
-        </p:spPr>
-        <p:style>
-          <a:lnRef idx="2">
-            <a:schemeClr val="accent1">
-              <a:shade val="50000"/>
-            </a:schemeClr>
-          </a:lnRef>
-          <a:fillRef idx="1">
-            <a:schemeClr val="accent1"/>
-          </a:fillRef>
-          <a:effectRef idx="0">
-            <a:schemeClr val="accent1"/>
-          </a:effectRef>
-          <a:fontRef idx="minor">
-            <a:schemeClr val="lt1"/>
-          </a:fontRef>
-        </p:style>
-        <p:txBody>
-          <a:bodyPr rtlCol="0" anchor="t"/>
-          <a:lstStyle/>
-          <a:p>
-            <a:pPr algn="ctr"/>
-            <a:r>
-              <a:rPr lang="en-US" sz="1000" b="1" dirty="0" err="1" smtClean="0">
-                <a:solidFill>
-                  <a:schemeClr val="tx1"/>
-                </a:solidFill>
-              </a:rPr>
-              <a:t>Ejecutable</a:t>
-            </a:r>
-            <a:endParaRPr lang="en-US" sz="1000" b="1" dirty="0" smtClean="0">
-              <a:solidFill>
-                <a:schemeClr val="tx1"/>
-              </a:solidFill>
-            </a:endParaRPr>
-          </a:p>
-          <a:p>
-            <a:r>
-              <a:rPr lang="en-US" sz="1000" dirty="0" smtClean="0">
-                <a:solidFill>
-                  <a:schemeClr val="tx1"/>
-                </a:solidFill>
-              </a:rPr>
-              <a:t>*#id</a:t>
-            </a:r>
-          </a:p>
-          <a:p>
-            <a:r>
-              <a:rPr lang="en-US" sz="1000" dirty="0" smtClean="0">
-                <a:solidFill>
-                  <a:schemeClr val="tx1"/>
-                </a:solidFill>
-              </a:rPr>
-              <a:t>*</a:t>
-            </a:r>
-            <a:r>
-              <a:rPr lang="en-US" sz="1000" dirty="0" err="1" smtClean="0">
-                <a:solidFill>
-                  <a:schemeClr val="tx1"/>
-                </a:solidFill>
-              </a:rPr>
-              <a:t>nombre</a:t>
-            </a:r>
-            <a:endParaRPr lang="en-US" sz="1000" dirty="0" smtClean="0">
-              <a:solidFill>
-                <a:schemeClr val="tx1"/>
-              </a:solidFill>
-            </a:endParaRPr>
-          </a:p>
-          <a:p>
-            <a:r>
-              <a:rPr lang="en-US" sz="1000" dirty="0" smtClean="0">
-                <a:solidFill>
-                  <a:schemeClr val="tx1"/>
-                </a:solidFill>
-              </a:rPr>
-              <a:t>*</a:t>
-            </a:r>
-            <a:r>
-              <a:rPr lang="en-US" sz="1000" dirty="0" err="1" smtClean="0">
-                <a:solidFill>
-                  <a:schemeClr val="tx1"/>
-                </a:solidFill>
-              </a:rPr>
-              <a:t>tipo</a:t>
-            </a:r>
-            <a:r>
-              <a:rPr lang="en-US" sz="1000" dirty="0" smtClean="0">
-                <a:solidFill>
-                  <a:schemeClr val="tx1"/>
-                </a:solidFill>
-              </a:rPr>
-              <a:t> (</a:t>
-            </a:r>
-            <a:r>
-              <a:rPr lang="en-US" sz="1000" dirty="0" err="1" smtClean="0">
-                <a:solidFill>
-                  <a:schemeClr val="tx1"/>
-                </a:solidFill>
-              </a:rPr>
-              <a:t>cliente</a:t>
-            </a:r>
-            <a:r>
-              <a:rPr lang="en-US" sz="1000" dirty="0" smtClean="0">
-                <a:solidFill>
-                  <a:schemeClr val="tx1"/>
-                </a:solidFill>
-              </a:rPr>
-              <a:t> / </a:t>
-            </a:r>
-            <a:r>
-              <a:rPr lang="en-US" sz="1000" dirty="0" err="1" smtClean="0">
-                <a:solidFill>
-                  <a:schemeClr val="tx1"/>
-                </a:solidFill>
-              </a:rPr>
-              <a:t>servidor</a:t>
-            </a:r>
-            <a:r>
-              <a:rPr lang="en-US" sz="1000" dirty="0" smtClean="0">
-                <a:solidFill>
-                  <a:schemeClr val="tx1"/>
-                </a:solidFill>
-              </a:rPr>
-              <a:t>)</a:t>
-            </a:r>
-          </a:p>
-          <a:p>
-            <a:r>
-              <a:rPr lang="en-US" sz="1000" dirty="0" smtClean="0">
-                <a:solidFill>
-                  <a:schemeClr val="tx1"/>
-                </a:solidFill>
-              </a:rPr>
-              <a:t>*path</a:t>
-            </a:r>
-          </a:p>
-        </p:txBody>
-      </p:sp>
-      <p:sp>
-        <p:nvSpPr>
-          <p:cNvPr id="51" name="35 Triángulo isósceles"/>
-          <p:cNvSpPr/>
-          <p:nvPr/>
-        </p:nvSpPr>
-        <p:spPr>
-          <a:xfrm rot="5400000">
-            <a:off x="1511660" y="1520791"/>
-            <a:ext cx="360039" cy="144016"/>
-          </a:xfrm>
-          <a:prstGeom prst="triangle">
-            <a:avLst>
-              <a:gd name="adj" fmla="val 57586"/>
-            </a:avLst>
-          </a:prstGeom>
-          <a:noFill/>
-          <a:ln w="9525" cmpd="sng">
-            <a:solidFill>
-              <a:schemeClr val="tx1"/>
-            </a:solidFill>
-          </a:ln>
-        </p:spPr>
-        <p:style>
-          <a:lnRef idx="2">
-            <a:schemeClr val="accent1">
-              <a:shade val="50000"/>
-            </a:schemeClr>
-          </a:lnRef>
-          <a:fillRef idx="1">
-            <a:schemeClr val="accent1"/>
-          </a:fillRef>
-          <a:effectRef idx="0">
-            <a:schemeClr val="accent1"/>
-          </a:effectRef>
-          <a:fontRef idx="minor">
-            <a:schemeClr val="lt1"/>
-          </a:fontRef>
-        </p:style>
-        <p:txBody>
-          <a:bodyPr rtlCol="0" anchor="ctr"/>
-          <a:lstStyle/>
-          <a:p>
-            <a:pPr algn="ctr"/>
-            <a:endParaRPr lang="es-VE"/>
-          </a:p>
-        </p:txBody>
-      </p:sp>
       <p:cxnSp>
         <p:nvCxnSpPr>
-          <p:cNvPr id="62" name="190 Conector angular"/>
-          <p:cNvCxnSpPr>
-            <a:stCxn id="4" idx="1"/>
-          </p:cNvCxnSpPr>
+          <p:cNvPr id="85" name="Elbow Connector 307"/>
+          <p:cNvCxnSpPr/>
           <p:nvPr/>
         </p:nvCxnSpPr>
         <p:spPr>
-          <a:xfrm rot="10800000" flipV="1">
-            <a:off x="539552" y="432048"/>
-            <a:ext cx="360040" cy="404664"/>
-          </a:xfrm>
-          <a:prstGeom prst="bentConnector2">
-            <a:avLst/>
+          <a:xfrm>
+            <a:off x="395536" y="4149080"/>
+            <a:ext cx="648072" cy="72008"/>
+          </a:xfrm>
+          <a:prstGeom prst="bentConnector3">
+            <a:avLst>
+              <a:gd name="adj1" fmla="val 50000"/>
+            </a:avLst>
           </a:prstGeom>
           <a:ln>
             <a:solidFill>
               <a:schemeClr val="tx1"/>
             </a:solidFill>
+            <a:prstDash val="dash"/>
           </a:ln>
         </p:spPr>
         <p:style>
@@ -6307,64 +6054,18 @@
           </a:fontRef>
         </p:style>
       </p:cxnSp>
-      <p:sp>
-        <p:nvSpPr>
-          <p:cNvPr id="63" name="64 Triángulo isósceles"/>
-          <p:cNvSpPr/>
-          <p:nvPr/>
-        </p:nvSpPr>
-        <p:spPr>
-          <a:xfrm rot="16027436">
-            <a:off x="674800" y="345582"/>
-            <a:ext cx="305221" cy="128519"/>
-          </a:xfrm>
-          <a:prstGeom prst="triangle">
-            <a:avLst/>
-          </a:prstGeom>
-          <a:noFill/>
-          <a:ln w="9525" cmpd="sng">
-            <a:solidFill>
-              <a:schemeClr val="tx1"/>
-            </a:solidFill>
-          </a:ln>
-        </p:spPr>
-        <p:style>
-          <a:lnRef idx="2">
-            <a:schemeClr val="accent1">
-              <a:shade val="50000"/>
-            </a:schemeClr>
-          </a:lnRef>
-          <a:fillRef idx="1">
-            <a:schemeClr val="accent1"/>
-          </a:fillRef>
-          <a:effectRef idx="0">
-            <a:schemeClr val="accent1"/>
-          </a:effectRef>
-          <a:fontRef idx="minor">
-            <a:schemeClr val="lt1"/>
-          </a:fontRef>
-        </p:style>
-        <p:txBody>
-          <a:bodyPr rtlCol="0" anchor="ctr"/>
-          <a:lstStyle/>
-          <a:p>
-            <a:pPr algn="ctr"/>
-            <a:endParaRPr lang="es-VE"/>
-          </a:p>
-        </p:txBody>
-      </p:sp>
       <p:cxnSp>
         <p:nvCxnSpPr>
-          <p:cNvPr id="66" name="Elbow Connector 307"/>
+          <p:cNvPr id="90" name="Elbow Connector 307"/>
           <p:cNvCxnSpPr>
-            <a:endCxn id="46" idx="0"/>
+            <a:endCxn id="78" idx="1"/>
           </p:cNvCxnSpPr>
           <p:nvPr/>
         </p:nvCxnSpPr>
         <p:spPr>
-          <a:xfrm rot="16200000" flipH="1">
-            <a:off x="507148" y="797107"/>
-            <a:ext cx="360040" cy="295233"/>
+          <a:xfrm>
+            <a:off x="1043608" y="5949280"/>
+            <a:ext cx="720080" cy="252028"/>
           </a:xfrm>
           <a:prstGeom prst="bentConnector3">
             <a:avLst>

</xml_diff>